<commit_message>
End of lecture 5, beginning of lecture 6
</commit_message>
<xml_diff>
--- a/lecture5/lecture5.pptx
+++ b/lecture5/lecture5.pptx
@@ -14,8 +14,9 @@
     <p:sldId id="260" r:id="rId8"/>
     <p:sldId id="261" r:id="rId9"/>
     <p:sldId id="262" r:id="rId10"/>
-    <p:sldId id="263" r:id="rId11"/>
-    <p:sldId id="265" r:id="rId12"/>
+    <p:sldId id="265" r:id="rId11"/>
+    <p:sldId id="263" r:id="rId12"/>
+    <p:sldId id="267" r:id="rId13"/>
   </p:sldIdLst>
   <p:sldSz cx="12192000" cy="6858000"/>
   <p:notesSz cx="6858000" cy="9144000"/>
@@ -844,7 +845,7 @@
           <a:p>
             <a:fld id="{68854FD7-F343-4A42-89E7-0EA4AA30A707}" type="datetimeFigureOut">
               <a:rPr lang="en-US" smtClean="0"/>
-              <a:t>10/25/2021</a:t>
+              <a:t>11/12/2021</a:t>
             </a:fld>
             <a:endParaRPr lang="en-US"/>
           </a:p>
@@ -1095,7 +1096,7 @@
           <a:p>
             <a:fld id="{68854FD7-F343-4A42-89E7-0EA4AA30A707}" type="datetimeFigureOut">
               <a:rPr lang="en-US" smtClean="0"/>
-              <a:t>10/25/2021</a:t>
+              <a:t>11/12/2021</a:t>
             </a:fld>
             <a:endParaRPr lang="en-US"/>
           </a:p>
@@ -1409,7 +1410,7 @@
           <a:p>
             <a:fld id="{68854FD7-F343-4A42-89E7-0EA4AA30A707}" type="datetimeFigureOut">
               <a:rPr lang="en-US" smtClean="0"/>
-              <a:t>10/25/2021</a:t>
+              <a:t>11/12/2021</a:t>
             </a:fld>
             <a:endParaRPr lang="en-US"/>
           </a:p>
@@ -1750,7 +1751,7 @@
           <a:p>
             <a:fld id="{68854FD7-F343-4A42-89E7-0EA4AA30A707}" type="datetimeFigureOut">
               <a:rPr lang="en-US" smtClean="0"/>
-              <a:t>10/25/2021</a:t>
+              <a:t>11/12/2021</a:t>
             </a:fld>
             <a:endParaRPr lang="en-US"/>
           </a:p>
@@ -2064,7 +2065,7 @@
           <a:p>
             <a:fld id="{68854FD7-F343-4A42-89E7-0EA4AA30A707}" type="datetimeFigureOut">
               <a:rPr lang="en-US" smtClean="0"/>
-              <a:t>10/25/2021</a:t>
+              <a:t>11/12/2021</a:t>
             </a:fld>
             <a:endParaRPr lang="en-US"/>
           </a:p>
@@ -2457,7 +2458,7 @@
           <a:p>
             <a:fld id="{68854FD7-F343-4A42-89E7-0EA4AA30A707}" type="datetimeFigureOut">
               <a:rPr lang="en-US" smtClean="0"/>
-              <a:t>10/25/2021</a:t>
+              <a:t>11/12/2021</a:t>
             </a:fld>
             <a:endParaRPr lang="en-US"/>
           </a:p>
@@ -2627,7 +2628,7 @@
           <a:p>
             <a:fld id="{68854FD7-F343-4A42-89E7-0EA4AA30A707}" type="datetimeFigureOut">
               <a:rPr lang="en-US" smtClean="0"/>
-              <a:t>10/25/2021</a:t>
+              <a:t>11/12/2021</a:t>
             </a:fld>
             <a:endParaRPr lang="en-US"/>
           </a:p>
@@ -2807,7 +2808,7 @@
           <a:p>
             <a:fld id="{68854FD7-F343-4A42-89E7-0EA4AA30A707}" type="datetimeFigureOut">
               <a:rPr lang="en-US" smtClean="0"/>
-              <a:t>10/25/2021</a:t>
+              <a:t>11/12/2021</a:t>
             </a:fld>
             <a:endParaRPr lang="en-US"/>
           </a:p>
@@ -2983,7 +2984,7 @@
           <a:p>
             <a:fld id="{68854FD7-F343-4A42-89E7-0EA4AA30A707}" type="datetimeFigureOut">
               <a:rPr lang="en-US" smtClean="0"/>
-              <a:t>10/25/2021</a:t>
+              <a:t>11/12/2021</a:t>
             </a:fld>
             <a:endParaRPr lang="en-US"/>
           </a:p>
@@ -3230,7 +3231,7 @@
           <a:p>
             <a:fld id="{68854FD7-F343-4A42-89E7-0EA4AA30A707}" type="datetimeFigureOut">
               <a:rPr lang="en-US" smtClean="0"/>
-              <a:t>10/25/2021</a:t>
+              <a:t>11/12/2021</a:t>
             </a:fld>
             <a:endParaRPr lang="en-US"/>
           </a:p>
@@ -3462,7 +3463,7 @@
           <a:p>
             <a:fld id="{68854FD7-F343-4A42-89E7-0EA4AA30A707}" type="datetimeFigureOut">
               <a:rPr lang="en-US" smtClean="0"/>
-              <a:t>10/25/2021</a:t>
+              <a:t>11/12/2021</a:t>
             </a:fld>
             <a:endParaRPr lang="en-US"/>
           </a:p>
@@ -3836,7 +3837,7 @@
           <a:p>
             <a:fld id="{68854FD7-F343-4A42-89E7-0EA4AA30A707}" type="datetimeFigureOut">
               <a:rPr lang="en-US" smtClean="0"/>
-              <a:t>10/25/2021</a:t>
+              <a:t>11/12/2021</a:t>
             </a:fld>
             <a:endParaRPr lang="en-US"/>
           </a:p>
@@ -3959,7 +3960,7 @@
           <a:p>
             <a:fld id="{68854FD7-F343-4A42-89E7-0EA4AA30A707}" type="datetimeFigureOut">
               <a:rPr lang="en-US" smtClean="0"/>
-              <a:t>10/25/2021</a:t>
+              <a:t>11/12/2021</a:t>
             </a:fld>
             <a:endParaRPr lang="en-US"/>
           </a:p>
@@ -4054,7 +4055,7 @@
           <a:p>
             <a:fld id="{68854FD7-F343-4A42-89E7-0EA4AA30A707}" type="datetimeFigureOut">
               <a:rPr lang="en-US" smtClean="0"/>
-              <a:t>10/25/2021</a:t>
+              <a:t>11/12/2021</a:t>
             </a:fld>
             <a:endParaRPr lang="en-US"/>
           </a:p>
@@ -4309,7 +4310,7 @@
           <a:p>
             <a:fld id="{68854FD7-F343-4A42-89E7-0EA4AA30A707}" type="datetimeFigureOut">
               <a:rPr lang="en-US" smtClean="0"/>
-              <a:t>10/25/2021</a:t>
+              <a:t>11/12/2021</a:t>
             </a:fld>
             <a:endParaRPr lang="en-US"/>
           </a:p>
@@ -4572,7 +4573,7 @@
           <a:p>
             <a:fld id="{68854FD7-F343-4A42-89E7-0EA4AA30A707}" type="datetimeFigureOut">
               <a:rPr lang="en-US" smtClean="0"/>
-              <a:t>10/25/2021</a:t>
+              <a:t>11/12/2021</a:t>
             </a:fld>
             <a:endParaRPr lang="en-US"/>
           </a:p>
@@ -5315,7 +5316,7 @@
           <a:p>
             <a:fld id="{68854FD7-F343-4A42-89E7-0EA4AA30A707}" type="datetimeFigureOut">
               <a:rPr lang="en-US" smtClean="0"/>
-              <a:t>10/25/2021</a:t>
+              <a:t>11/12/2021</a:t>
             </a:fld>
             <a:endParaRPr lang="en-US"/>
           </a:p>
@@ -5844,7 +5845,7 @@
           <p:cNvPr id="4" name="Title 1">
             <a:extLst>
               <a:ext uri="{FF2B5EF4-FFF2-40B4-BE49-F238E27FC236}">
-                <a16:creationId xmlns="" xmlns:a16="http://schemas.microsoft.com/office/drawing/2014/main" id="{13B2D513-0F9C-4439-A697-A295339863B6}"/>
+                <a16:creationId xmlns:a16="http://schemas.microsoft.com/office/drawing/2014/main" xmlns="" id="{13B2D513-0F9C-4439-A697-A295339863B6}"/>
               </a:ext>
             </a:extLst>
           </p:cNvPr>
@@ -5887,7 +5888,7 @@
           <p:cNvPr id="5" name="Subtitle 2">
             <a:extLst>
               <a:ext uri="{FF2B5EF4-FFF2-40B4-BE49-F238E27FC236}">
-                <a16:creationId xmlns="" xmlns:a16="http://schemas.microsoft.com/office/drawing/2014/main" id="{37C9EE23-73D5-41F8-AFFF-4BA477FCB643}"/>
+                <a16:creationId xmlns:a16="http://schemas.microsoft.com/office/drawing/2014/main" xmlns="" id="{37C9EE23-73D5-41F8-AFFF-4BA477FCB643}"/>
               </a:ext>
             </a:extLst>
           </p:cNvPr>
@@ -6037,10 +6038,571 @@
       </p:grpSpPr>
       <p:sp>
         <p:nvSpPr>
+          <p:cNvPr id="3" name="Объект 2"/>
+          <p:cNvSpPr>
+            <a:spLocks noGrp="1"/>
+          </p:cNvSpPr>
+          <p:nvPr>
+            <p:ph idx="1"/>
+          </p:nvPr>
+        </p:nvSpPr>
+        <p:spPr>
+          <a:xfrm>
+            <a:off x="5175637" y="894401"/>
+            <a:ext cx="6793940" cy="5773099"/>
+          </a:xfrm>
+          <a:solidFill>
+            <a:schemeClr val="bg1"/>
+          </a:solidFill>
+        </p:spPr>
+        <p:txBody>
+          <a:bodyPr>
+            <a:normAutofit/>
+          </a:bodyPr>
+          <a:lstStyle/>
+          <a:p>
+            <a:r>
+              <a:rPr lang="ru-RU" dirty="0" smtClean="0"/>
+              <a:t>Чтобы использовать итератор с алгоритмами </a:t>
+            </a:r>
+            <a:r>
+              <a:rPr lang="en-US" dirty="0" smtClean="0"/>
+              <a:t>STL</a:t>
+            </a:r>
+            <a:r>
+              <a:rPr lang="ru-RU" dirty="0" smtClean="0"/>
+              <a:t>, нужно предоставить для него специализацию шаблонной структуры </a:t>
+            </a:r>
+            <a:r>
+              <a:rPr lang="en-US" dirty="0" err="1" smtClean="0"/>
+              <a:t>iterator_traits</a:t>
+            </a:r>
+            <a:endParaRPr lang="ru-RU" dirty="0" smtClean="0"/>
+          </a:p>
+          <a:p>
+            <a:r>
+              <a:rPr lang="ru-RU" dirty="0" smtClean="0"/>
+              <a:t>Таким образом, реализация алгоритмов становятся независимой от типов данных – доступ к ним осуществляется через </a:t>
+            </a:r>
+            <a:r>
+              <a:rPr lang="en-US" dirty="0" err="1" smtClean="0"/>
+              <a:t>iterator_traits</a:t>
+            </a:r>
+            <a:endParaRPr lang="ru-RU" dirty="0" smtClean="0"/>
+          </a:p>
+          <a:p>
+            <a:r>
+              <a:rPr lang="ru-RU" dirty="0" smtClean="0"/>
+              <a:t>Псевдонимы типов данных (</a:t>
+            </a:r>
+            <a:r>
+              <a:rPr lang="en-US" dirty="0" err="1" smtClean="0"/>
+              <a:t>typedef</a:t>
+            </a:r>
+            <a:r>
+              <a:rPr lang="en-US" dirty="0" smtClean="0"/>
+              <a:t>, using</a:t>
+            </a:r>
+            <a:r>
+              <a:rPr lang="ru-RU" dirty="0" smtClean="0"/>
+              <a:t>), определённые в этих целях </a:t>
+            </a:r>
+            <a:r>
+              <a:rPr lang="en-US" dirty="0" smtClean="0"/>
+              <a:t> </a:t>
+            </a:r>
+            <a:r>
+              <a:rPr lang="ru-RU" dirty="0" smtClean="0"/>
+              <a:t>внутри класса, называются членами типов</a:t>
+            </a:r>
+            <a:endParaRPr lang="en-US" dirty="0" smtClean="0"/>
+          </a:p>
+          <a:p>
+            <a:r>
+              <a:rPr lang="ru-RU" dirty="0" smtClean="0"/>
+              <a:t>Член типа </a:t>
+            </a:r>
+            <a:r>
+              <a:rPr lang="en-US" dirty="0" err="1" smtClean="0"/>
+              <a:t>iterator_category</a:t>
+            </a:r>
+            <a:r>
+              <a:rPr lang="en-US" dirty="0" smtClean="0"/>
+              <a:t> </a:t>
+            </a:r>
+            <a:r>
+              <a:rPr lang="ru-RU" dirty="0" smtClean="0"/>
+              <a:t>соответствует типу итератора. При этом </a:t>
+            </a:r>
+            <a:r>
+              <a:rPr lang="en-US" dirty="0" err="1" smtClean="0"/>
+              <a:t>forward_iterator_tag</a:t>
+            </a:r>
+            <a:r>
+              <a:rPr lang="en-US" dirty="0" smtClean="0"/>
+              <a:t> </a:t>
+            </a:r>
+            <a:r>
+              <a:rPr lang="ru-RU" dirty="0" smtClean="0"/>
+              <a:t>не наследуется от </a:t>
+            </a:r>
+            <a:r>
+              <a:rPr lang="en-US" dirty="0" err="1" smtClean="0"/>
+              <a:t>output_iterator_tag</a:t>
+            </a:r>
+            <a:endParaRPr lang="en-US" dirty="0" smtClean="0"/>
+          </a:p>
+          <a:p>
+            <a:r>
+              <a:rPr lang="en-US" dirty="0" err="1" smtClean="0"/>
+              <a:t>iterator_category</a:t>
+            </a:r>
+            <a:r>
+              <a:rPr lang="en-US" dirty="0" smtClean="0"/>
+              <a:t> </a:t>
+            </a:r>
+            <a:r>
+              <a:rPr lang="ru-RU" dirty="0" smtClean="0"/>
+              <a:t>может влиять на реализацию алгоритма</a:t>
+            </a:r>
+            <a:endParaRPr lang="en-US" dirty="0" smtClean="0"/>
+          </a:p>
+          <a:p>
+            <a:r>
+              <a:rPr lang="ru-RU" dirty="0" smtClean="0"/>
+              <a:t>Если итератору не требуются какие-либо члены данных, они определяется как </a:t>
+            </a:r>
+            <a:r>
+              <a:rPr lang="en-US" dirty="0" smtClean="0"/>
+              <a:t>void</a:t>
+            </a:r>
+            <a:endParaRPr lang="ru-RU" dirty="0" smtClean="0"/>
+          </a:p>
+          <a:p>
+            <a:r>
+              <a:rPr lang="en-US" dirty="0" err="1" smtClean="0"/>
+              <a:t>typedef</a:t>
+            </a:r>
+            <a:r>
+              <a:rPr lang="en-US" dirty="0" smtClean="0"/>
+              <a:t> </a:t>
+            </a:r>
+            <a:r>
+              <a:rPr lang="en-US" dirty="0" err="1" smtClean="0"/>
+              <a:t>typename</a:t>
+            </a:r>
+            <a:r>
+              <a:rPr lang="en-US" dirty="0" smtClean="0"/>
+              <a:t>… - </a:t>
+            </a:r>
+            <a:r>
+              <a:rPr lang="ru-RU" dirty="0" smtClean="0"/>
+              <a:t>старый вариант синтаксиса. Начиная с С</a:t>
+            </a:r>
+            <a:r>
+              <a:rPr lang="ru-RU" dirty="0"/>
+              <a:t>++</a:t>
+            </a:r>
+            <a:r>
+              <a:rPr lang="ru-RU" dirty="0" smtClean="0"/>
+              <a:t>11 можно также:</a:t>
+            </a:r>
+          </a:p>
+          <a:p>
+            <a:pPr marL="0" indent="0">
+              <a:buNone/>
+            </a:pPr>
+            <a:r>
+              <a:rPr lang="en-US" dirty="0" smtClean="0"/>
+              <a:t>using </a:t>
+            </a:r>
+            <a:r>
+              <a:rPr lang="en-US" dirty="0" err="1"/>
+              <a:t>difference_type</a:t>
+            </a:r>
+            <a:r>
+              <a:rPr lang="en-US" dirty="0"/>
+              <a:t> = </a:t>
+            </a:r>
+            <a:r>
+              <a:rPr lang="en-US" dirty="0" err="1" smtClean="0"/>
+              <a:t>ptrdiff_t</a:t>
+            </a:r>
+            <a:endParaRPr lang="en-US" dirty="0"/>
+          </a:p>
+          <a:p>
+            <a:pPr marL="0" indent="0">
+              <a:buNone/>
+            </a:pPr>
+            <a:endParaRPr lang="en-US" dirty="0"/>
+          </a:p>
+        </p:txBody>
+      </p:sp>
+      <p:sp>
+        <p:nvSpPr>
+          <p:cNvPr id="4" name="Title 1">
+            <a:extLst>
+              <a:ext uri="{FF2B5EF4-FFF2-40B4-BE49-F238E27FC236}">
+                <a16:creationId xmlns:a16="http://schemas.microsoft.com/office/drawing/2014/main" xmlns="" id="{AB45E17C-D635-444C-9E6E-9F0B20ABC34B}"/>
+              </a:ext>
+            </a:extLst>
+          </p:cNvPr>
+          <p:cNvSpPr txBox="1">
+            <a:spLocks/>
+          </p:cNvSpPr>
+          <p:nvPr/>
+        </p:nvSpPr>
+        <p:spPr>
+          <a:xfrm>
+            <a:off x="147891" y="157497"/>
+            <a:ext cx="11821686" cy="549808"/>
+          </a:xfrm>
+          <a:prstGeom prst="rect">
+            <a:avLst/>
+          </a:prstGeom>
+          <a:solidFill>
+            <a:schemeClr val="bg1"/>
+          </a:solidFill>
+          <a:ln>
+            <a:solidFill>
+              <a:schemeClr val="tx1"/>
+            </a:solidFill>
+          </a:ln>
+        </p:spPr>
+        <p:txBody>
+          <a:bodyPr vert="horz" lIns="91440" tIns="45720" rIns="91440" bIns="45720" rtlCol="0" anchor="t">
+            <a:noAutofit/>
+          </a:bodyPr>
+          <a:lstStyle>
+            <a:lvl1pPr algn="l" defTabSz="457200" rtl="0" eaLnBrk="1" latinLnBrk="0" hangingPunct="1">
+              <a:spcBef>
+                <a:spcPct val="0"/>
+              </a:spcBef>
+              <a:buNone/>
+              <a:defRPr sz="3600" kern="1200">
+                <a:solidFill>
+                  <a:schemeClr val="accent1"/>
+                </a:solidFill>
+                <a:latin typeface="+mj-lt"/>
+                <a:ea typeface="+mj-ea"/>
+                <a:cs typeface="+mj-cs"/>
+              </a:defRPr>
+            </a:lvl1pPr>
+            <a:lvl2pPr eaLnBrk="1" hangingPunct="1">
+              <a:defRPr>
+                <a:solidFill>
+                  <a:schemeClr val="tx2"/>
+                </a:solidFill>
+              </a:defRPr>
+            </a:lvl2pPr>
+            <a:lvl3pPr eaLnBrk="1" hangingPunct="1">
+              <a:defRPr>
+                <a:solidFill>
+                  <a:schemeClr val="tx2"/>
+                </a:solidFill>
+              </a:defRPr>
+            </a:lvl3pPr>
+            <a:lvl4pPr eaLnBrk="1" hangingPunct="1">
+              <a:defRPr>
+                <a:solidFill>
+                  <a:schemeClr val="tx2"/>
+                </a:solidFill>
+              </a:defRPr>
+            </a:lvl4pPr>
+            <a:lvl5pPr eaLnBrk="1" hangingPunct="1">
+              <a:defRPr>
+                <a:solidFill>
+                  <a:schemeClr val="tx2"/>
+                </a:solidFill>
+              </a:defRPr>
+            </a:lvl5pPr>
+            <a:lvl6pPr eaLnBrk="1" hangingPunct="1">
+              <a:defRPr>
+                <a:solidFill>
+                  <a:schemeClr val="tx2"/>
+                </a:solidFill>
+              </a:defRPr>
+            </a:lvl6pPr>
+            <a:lvl7pPr eaLnBrk="1" hangingPunct="1">
+              <a:defRPr>
+                <a:solidFill>
+                  <a:schemeClr val="tx2"/>
+                </a:solidFill>
+              </a:defRPr>
+            </a:lvl7pPr>
+            <a:lvl8pPr eaLnBrk="1" hangingPunct="1">
+              <a:defRPr>
+                <a:solidFill>
+                  <a:schemeClr val="tx2"/>
+                </a:solidFill>
+              </a:defRPr>
+            </a:lvl8pPr>
+            <a:lvl9pPr eaLnBrk="1" hangingPunct="1">
+              <a:defRPr>
+                <a:solidFill>
+                  <a:schemeClr val="tx2"/>
+                </a:solidFill>
+              </a:defRPr>
+            </a:lvl9pPr>
+          </a:lstStyle>
+          <a:p>
+            <a:pPr algn="ctr"/>
+            <a:r>
+              <a:rPr lang="en-US" sz="2800" dirty="0" smtClean="0"/>
+              <a:t>Iterator traits </a:t>
+            </a:r>
+            <a:r>
+              <a:rPr lang="ru-RU" sz="2800" dirty="0" smtClean="0"/>
+              <a:t>и пользовательские итераторы</a:t>
+            </a:r>
+            <a:endParaRPr lang="en-US" sz="2800" dirty="0"/>
+          </a:p>
+        </p:txBody>
+      </p:sp>
+      <p:pic>
+        <p:nvPicPr>
+          <p:cNvPr id="5" name="Рисунок 4"/>
+          <p:cNvPicPr>
+            <a:picLocks noChangeAspect="1"/>
+          </p:cNvPicPr>
+          <p:nvPr/>
+        </p:nvPicPr>
+        <p:blipFill>
+          <a:blip r:embed="rId2"/>
+          <a:stretch>
+            <a:fillRect/>
+          </a:stretch>
+        </p:blipFill>
+        <p:spPr>
+          <a:xfrm>
+            <a:off x="147891" y="1038041"/>
+            <a:ext cx="4823168" cy="1766230"/>
+          </a:xfrm>
+          <a:prstGeom prst="rect">
+            <a:avLst/>
+          </a:prstGeom>
+        </p:spPr>
+      </p:pic>
+      <p:pic>
+        <p:nvPicPr>
+          <p:cNvPr id="6" name="Рисунок 5"/>
+          <p:cNvPicPr>
+            <a:picLocks noChangeAspect="1"/>
+          </p:cNvPicPr>
+          <p:nvPr/>
+        </p:nvPicPr>
+        <p:blipFill>
+          <a:blip r:embed="rId3"/>
+          <a:stretch>
+            <a:fillRect/>
+          </a:stretch>
+        </p:blipFill>
+        <p:spPr>
+          <a:xfrm>
+            <a:off x="1543056" y="2654020"/>
+            <a:ext cx="3470968" cy="2639605"/>
+          </a:xfrm>
+          <a:prstGeom prst="rect">
+            <a:avLst/>
+          </a:prstGeom>
+          <a:ln>
+            <a:solidFill>
+              <a:schemeClr val="accent1"/>
+            </a:solidFill>
+          </a:ln>
+        </p:spPr>
+      </p:pic>
+      <p:sp>
+        <p:nvSpPr>
+          <p:cNvPr id="7" name="TextBox 6"/>
+          <p:cNvSpPr txBox="1"/>
+          <p:nvPr/>
+        </p:nvSpPr>
+        <p:spPr>
+          <a:xfrm>
+            <a:off x="2139884" y="719285"/>
+            <a:ext cx="1228221" cy="369332"/>
+          </a:xfrm>
+          <a:prstGeom prst="rect">
+            <a:avLst/>
+          </a:prstGeom>
+          <a:noFill/>
+        </p:spPr>
+        <p:txBody>
+          <a:bodyPr wrap="none" rtlCol="0">
+            <a:spAutoFit/>
+          </a:bodyPr>
+          <a:lstStyle/>
+          <a:p>
+            <a:r>
+              <a:rPr lang="en-US" dirty="0" smtClean="0"/>
+              <a:t>&lt;iterator&gt;</a:t>
+            </a:r>
+            <a:endParaRPr lang="en-US" dirty="0"/>
+          </a:p>
+        </p:txBody>
+      </p:sp>
+      <p:cxnSp>
+        <p:nvCxnSpPr>
+          <p:cNvPr id="9" name="Прямая соединительная линия 8"/>
+          <p:cNvCxnSpPr/>
+          <p:nvPr/>
+        </p:nvCxnSpPr>
+        <p:spPr>
+          <a:xfrm>
+            <a:off x="5014024" y="1774746"/>
+            <a:ext cx="0" cy="879274"/>
+          </a:xfrm>
+          <a:prstGeom prst="line">
+            <a:avLst/>
+          </a:prstGeom>
+        </p:spPr>
+        <p:style>
+          <a:lnRef idx="1">
+            <a:schemeClr val="accent1"/>
+          </a:lnRef>
+          <a:fillRef idx="0">
+            <a:schemeClr val="accent1"/>
+          </a:fillRef>
+          <a:effectRef idx="0">
+            <a:schemeClr val="accent1"/>
+          </a:effectRef>
+          <a:fontRef idx="minor">
+            <a:schemeClr val="tx1"/>
+          </a:fontRef>
+        </p:style>
+      </p:cxnSp>
+      <p:sp>
+        <p:nvSpPr>
+          <p:cNvPr id="10" name="Прямоугольник 9"/>
+          <p:cNvSpPr/>
+          <p:nvPr/>
+        </p:nvSpPr>
+        <p:spPr>
+          <a:xfrm>
+            <a:off x="3509698" y="1529650"/>
+            <a:ext cx="1504326" cy="245096"/>
+          </a:xfrm>
+          <a:prstGeom prst="rect">
+            <a:avLst/>
+          </a:prstGeom>
+          <a:noFill/>
+        </p:spPr>
+        <p:style>
+          <a:lnRef idx="2">
+            <a:schemeClr val="accent1">
+              <a:shade val="50000"/>
+            </a:schemeClr>
+          </a:lnRef>
+          <a:fillRef idx="1">
+            <a:schemeClr val="accent1"/>
+          </a:fillRef>
+          <a:effectRef idx="0">
+            <a:schemeClr val="accent1"/>
+          </a:effectRef>
+          <a:fontRef idx="minor">
+            <a:schemeClr val="lt1"/>
+          </a:fontRef>
+        </p:style>
+        <p:txBody>
+          <a:bodyPr rtlCol="0" anchor="ctr"/>
+          <a:lstStyle/>
+          <a:p>
+            <a:pPr algn="ctr"/>
+            <a:endParaRPr lang="en-US"/>
+          </a:p>
+        </p:txBody>
+      </p:sp>
+      <p:pic>
+        <p:nvPicPr>
+          <p:cNvPr id="14" name="Рисунок 13"/>
+          <p:cNvPicPr>
+            <a:picLocks noChangeAspect="1"/>
+          </p:cNvPicPr>
+          <p:nvPr/>
+        </p:nvPicPr>
+        <p:blipFill>
+          <a:blip r:embed="rId4"/>
+          <a:stretch>
+            <a:fillRect/>
+          </a:stretch>
+        </p:blipFill>
+        <p:spPr>
+          <a:xfrm>
+            <a:off x="147891" y="5480721"/>
+            <a:ext cx="5113676" cy="992564"/>
+          </a:xfrm>
+          <a:prstGeom prst="rect">
+            <a:avLst/>
+          </a:prstGeom>
+        </p:spPr>
+      </p:pic>
+      <p:sp>
+        <p:nvSpPr>
+          <p:cNvPr id="16" name="TextBox 15"/>
+          <p:cNvSpPr txBox="1"/>
+          <p:nvPr/>
+        </p:nvSpPr>
+        <p:spPr>
+          <a:xfrm>
+            <a:off x="1182032" y="6364847"/>
+            <a:ext cx="2959465" cy="369332"/>
+          </a:xfrm>
+          <a:prstGeom prst="rect">
+            <a:avLst/>
+          </a:prstGeom>
+          <a:noFill/>
+        </p:spPr>
+        <p:txBody>
+          <a:bodyPr wrap="none" rtlCol="0">
+            <a:spAutoFit/>
+          </a:bodyPr>
+          <a:lstStyle/>
+          <a:p>
+            <a:r>
+              <a:rPr lang="ru-RU" dirty="0" smtClean="0"/>
+              <a:t>Вариант с наследованием</a:t>
+            </a:r>
+            <a:endParaRPr lang="en-US" dirty="0"/>
+          </a:p>
+        </p:txBody>
+      </p:sp>
+    </p:spTree>
+    <p:extLst>
+      <p:ext uri="{BB962C8B-B14F-4D97-AF65-F5344CB8AC3E}">
+        <p14:creationId xmlns:p14="http://schemas.microsoft.com/office/powerpoint/2010/main" val="2207738432"/>
+      </p:ext>
+    </p:extLst>
+  </p:cSld>
+  <p:clrMapOvr>
+    <a:masterClrMapping/>
+  </p:clrMapOvr>
+</p:sld>
+</file>
+
+<file path=ppt/slides/slide11.xml><?xml version="1.0" encoding="utf-8"?>
+<p:sld xmlns:a="http://schemas.openxmlformats.org/drawingml/2006/main" xmlns:r="http://schemas.openxmlformats.org/officeDocument/2006/relationships" xmlns:p="http://schemas.openxmlformats.org/presentationml/2006/main">
+  <p:cSld>
+    <p:spTree>
+      <p:nvGrpSpPr>
+        <p:cNvPr id="1" name=""/>
+        <p:cNvGrpSpPr/>
+        <p:nvPr/>
+      </p:nvGrpSpPr>
+      <p:grpSpPr>
+        <a:xfrm>
+          <a:off x="0" y="0"/>
+          <a:ext cx="0" cy="0"/>
+          <a:chOff x="0" y="0"/>
+          <a:chExt cx="0" cy="0"/>
+        </a:xfrm>
+      </p:grpSpPr>
+      <p:sp>
+        <p:nvSpPr>
           <p:cNvPr id="2" name="Title 1">
             <a:extLst>
               <a:ext uri="{FF2B5EF4-FFF2-40B4-BE49-F238E27FC236}">
-                <a16:creationId xmlns="" xmlns:a16="http://schemas.microsoft.com/office/drawing/2014/main" id="{AB45E17C-D635-444C-9E6E-9F0B20ABC34B}"/>
+                <a16:creationId xmlns:a16="http://schemas.microsoft.com/office/drawing/2014/main" xmlns="" id="{AB45E17C-D635-444C-9E6E-9F0B20ABC34B}"/>
               </a:ext>
             </a:extLst>
           </p:cNvPr>
@@ -6184,20 +6746,6 @@
             <a:normAutofit/>
           </a:bodyPr>
           <a:lstStyle/>
-          <a:p>
-            <a:r>
-              <a:rPr lang="ru-RU" dirty="0" smtClean="0"/>
-              <a:t>Реверсивные </a:t>
-            </a:r>
-            <a:r>
-              <a:rPr lang="ru-RU" dirty="0"/>
-              <a:t>итераторы. Рассматривались в лекции </a:t>
-            </a:r>
-            <a:r>
-              <a:rPr lang="ru-RU" dirty="0" smtClean="0"/>
-              <a:t>1</a:t>
-            </a:r>
-          </a:p>
           <a:p>
             <a:r>
               <a:rPr lang="ru-RU" dirty="0" smtClean="0"/>
@@ -6856,7 +7404,7 @@
 </p:sld>
 </file>
 
-<file path=ppt/slides/slide11.xml><?xml version="1.0" encoding="utf-8"?>
+<file path=ppt/slides/slide12.xml><?xml version="1.0" encoding="utf-8"?>
 <p:sld xmlns:a="http://schemas.openxmlformats.org/drawingml/2006/main" xmlns:r="http://schemas.openxmlformats.org/officeDocument/2006/relationships" xmlns:p="http://schemas.openxmlformats.org/presentationml/2006/main">
   <p:cSld>
     <p:spTree>
@@ -6875,25 +7423,6 @@
       </p:grpSpPr>
       <p:sp>
         <p:nvSpPr>
-          <p:cNvPr id="2" name="Заголовок 1"/>
-          <p:cNvSpPr>
-            <a:spLocks noGrp="1"/>
-          </p:cNvSpPr>
-          <p:nvPr>
-            <p:ph type="title"/>
-          </p:nvPr>
-        </p:nvSpPr>
-        <p:spPr/>
-        <p:txBody>
-          <a:bodyPr/>
-          <a:lstStyle/>
-          <a:p>
-            <a:endParaRPr lang="en-US"/>
-          </a:p>
-        </p:txBody>
-      </p:sp>
-      <p:sp>
-        <p:nvSpPr>
           <p:cNvPr id="3" name="Объект 2"/>
           <p:cNvSpPr>
             <a:spLocks noGrp="1"/>
@@ -6902,11 +7431,794 @@
             <p:ph idx="1"/>
           </p:nvPr>
         </p:nvSpPr>
-        <p:spPr/>
+        <p:spPr>
+          <a:xfrm>
+            <a:off x="443058" y="926594"/>
+            <a:ext cx="5513859" cy="1230680"/>
+          </a:xfrm>
+          <a:solidFill>
+            <a:schemeClr val="bg1"/>
+          </a:solidFill>
+        </p:spPr>
         <p:txBody>
           <a:bodyPr/>
           <a:lstStyle/>
           <a:p>
+            <a:r>
+              <a:rPr lang="en-US" dirty="0" err="1" smtClean="0"/>
+              <a:t>O</a:t>
+            </a:r>
+            <a:r>
+              <a:rPr lang="en-US" dirty="0" err="1" smtClean="0"/>
+              <a:t>stream</a:t>
+            </a:r>
+            <a:r>
+              <a:rPr lang="en-US" dirty="0" err="1" smtClean="0"/>
+              <a:t>_iterator</a:t>
+            </a:r>
+            <a:r>
+              <a:rPr lang="en-US" dirty="0"/>
+              <a:t> </a:t>
+            </a:r>
+            <a:r>
+              <a:rPr lang="en-US" dirty="0" smtClean="0"/>
+              <a:t>– </a:t>
+            </a:r>
+            <a:r>
+              <a:rPr lang="ru-RU" dirty="0" smtClean="0"/>
+              <a:t>итератор на поток вывода. Вместо присваивания значения с разыменовыванием выполняют вставку в поток</a:t>
+            </a:r>
+            <a:endParaRPr lang="en-US" dirty="0"/>
+          </a:p>
+        </p:txBody>
+      </p:sp>
+      <p:sp>
+        <p:nvSpPr>
+          <p:cNvPr id="4" name="Title 1">
+            <a:extLst>
+              <a:ext uri="{FF2B5EF4-FFF2-40B4-BE49-F238E27FC236}">
+                <a16:creationId xmlns:a16="http://schemas.microsoft.com/office/drawing/2014/main" xmlns="" id="{AB45E17C-D635-444C-9E6E-9F0B20ABC34B}"/>
+              </a:ext>
+            </a:extLst>
+          </p:cNvPr>
+          <p:cNvSpPr txBox="1">
+            <a:spLocks/>
+          </p:cNvSpPr>
+          <p:nvPr/>
+        </p:nvSpPr>
+        <p:spPr>
+          <a:xfrm>
+            <a:off x="443058" y="128922"/>
+            <a:ext cx="11491275" cy="549808"/>
+          </a:xfrm>
+          <a:prstGeom prst="rect">
+            <a:avLst/>
+          </a:prstGeom>
+          <a:solidFill>
+            <a:schemeClr val="bg1"/>
+          </a:solidFill>
+          <a:ln>
+            <a:solidFill>
+              <a:schemeClr val="tx1"/>
+            </a:solidFill>
+          </a:ln>
+        </p:spPr>
+        <p:txBody>
+          <a:bodyPr vert="horz" lIns="91440" tIns="45720" rIns="91440" bIns="45720" rtlCol="0" anchor="t">
+            <a:noAutofit/>
+          </a:bodyPr>
+          <a:lstStyle>
+            <a:lvl1pPr algn="l" defTabSz="457200" rtl="0" eaLnBrk="1" latinLnBrk="0" hangingPunct="1">
+              <a:spcBef>
+                <a:spcPct val="0"/>
+              </a:spcBef>
+              <a:buNone/>
+              <a:defRPr sz="3600" kern="1200">
+                <a:solidFill>
+                  <a:schemeClr val="accent1"/>
+                </a:solidFill>
+                <a:latin typeface="+mj-lt"/>
+                <a:ea typeface="+mj-ea"/>
+                <a:cs typeface="+mj-cs"/>
+              </a:defRPr>
+            </a:lvl1pPr>
+            <a:lvl2pPr eaLnBrk="1" hangingPunct="1">
+              <a:defRPr>
+                <a:solidFill>
+                  <a:schemeClr val="tx2"/>
+                </a:solidFill>
+              </a:defRPr>
+            </a:lvl2pPr>
+            <a:lvl3pPr eaLnBrk="1" hangingPunct="1">
+              <a:defRPr>
+                <a:solidFill>
+                  <a:schemeClr val="tx2"/>
+                </a:solidFill>
+              </a:defRPr>
+            </a:lvl3pPr>
+            <a:lvl4pPr eaLnBrk="1" hangingPunct="1">
+              <a:defRPr>
+                <a:solidFill>
+                  <a:schemeClr val="tx2"/>
+                </a:solidFill>
+              </a:defRPr>
+            </a:lvl4pPr>
+            <a:lvl5pPr eaLnBrk="1" hangingPunct="1">
+              <a:defRPr>
+                <a:solidFill>
+                  <a:schemeClr val="tx2"/>
+                </a:solidFill>
+              </a:defRPr>
+            </a:lvl5pPr>
+            <a:lvl6pPr eaLnBrk="1" hangingPunct="1">
+              <a:defRPr>
+                <a:solidFill>
+                  <a:schemeClr val="tx2"/>
+                </a:solidFill>
+              </a:defRPr>
+            </a:lvl6pPr>
+            <a:lvl7pPr eaLnBrk="1" hangingPunct="1">
+              <a:defRPr>
+                <a:solidFill>
+                  <a:schemeClr val="tx2"/>
+                </a:solidFill>
+              </a:defRPr>
+            </a:lvl7pPr>
+            <a:lvl8pPr eaLnBrk="1" hangingPunct="1">
+              <a:defRPr>
+                <a:solidFill>
+                  <a:schemeClr val="tx2"/>
+                </a:solidFill>
+              </a:defRPr>
+            </a:lvl8pPr>
+            <a:lvl9pPr eaLnBrk="1" hangingPunct="1">
+              <a:defRPr>
+                <a:solidFill>
+                  <a:schemeClr val="tx2"/>
+                </a:solidFill>
+              </a:defRPr>
+            </a:lvl9pPr>
+          </a:lstStyle>
+          <a:p>
+            <a:pPr algn="ctr"/>
+            <a:r>
+              <a:rPr lang="ru-RU" sz="2800" dirty="0" smtClean="0"/>
+              <a:t>Итераторы-адаптеры</a:t>
+            </a:r>
+            <a:r>
+              <a:rPr lang="en-US" sz="2800" dirty="0" smtClean="0"/>
+              <a:t>: </a:t>
+            </a:r>
+            <a:r>
+              <a:rPr lang="ru-RU" sz="2800" dirty="0" smtClean="0"/>
+              <a:t>потоковые итераторы</a:t>
+            </a:r>
+            <a:r>
+              <a:rPr lang="en-US" sz="2800" dirty="0" smtClean="0"/>
+              <a:t> (stream iterators)</a:t>
+            </a:r>
+            <a:endParaRPr lang="en-US" sz="2800" dirty="0"/>
+          </a:p>
+        </p:txBody>
+      </p:sp>
+      <p:sp>
+        <p:nvSpPr>
+          <p:cNvPr id="5" name="Объект 2"/>
+          <p:cNvSpPr txBox="1">
+            <a:spLocks/>
+          </p:cNvSpPr>
+          <p:nvPr/>
+        </p:nvSpPr>
+        <p:spPr>
+          <a:xfrm>
+            <a:off x="6143348" y="926594"/>
+            <a:ext cx="5790985" cy="1230680"/>
+          </a:xfrm>
+          <a:prstGeom prst="rect">
+            <a:avLst/>
+          </a:prstGeom>
+          <a:solidFill>
+            <a:schemeClr val="bg1"/>
+          </a:solidFill>
+        </p:spPr>
+        <p:txBody>
+          <a:bodyPr vert="horz" lIns="91440" tIns="45720" rIns="91440" bIns="45720" rtlCol="0">
+            <a:normAutofit/>
+          </a:bodyPr>
+          <a:lstStyle>
+            <a:lvl1pPr marL="342900" indent="-342900" algn="l" defTabSz="457200" rtl="0" eaLnBrk="1" latinLnBrk="0" hangingPunct="1">
+              <a:spcBef>
+                <a:spcPts val="1000"/>
+              </a:spcBef>
+              <a:spcAft>
+                <a:spcPts val="0"/>
+              </a:spcAft>
+              <a:buClr>
+                <a:schemeClr val="accent1"/>
+              </a:buClr>
+              <a:buSzPct val="80000"/>
+              <a:buFont typeface="Wingdings 3" charset="2"/>
+              <a:buChar char=""/>
+              <a:defRPr sz="1800" kern="1200">
+                <a:solidFill>
+                  <a:schemeClr val="tx1">
+                    <a:lumMod val="75000"/>
+                    <a:lumOff val="25000"/>
+                  </a:schemeClr>
+                </a:solidFill>
+                <a:latin typeface="+mn-lt"/>
+                <a:ea typeface="+mn-ea"/>
+                <a:cs typeface="+mn-cs"/>
+              </a:defRPr>
+            </a:lvl1pPr>
+            <a:lvl2pPr marL="742950" indent="-285750" algn="l" defTabSz="457200" rtl="0" eaLnBrk="1" latinLnBrk="0" hangingPunct="1">
+              <a:spcBef>
+                <a:spcPts val="1000"/>
+              </a:spcBef>
+              <a:spcAft>
+                <a:spcPts val="0"/>
+              </a:spcAft>
+              <a:buClr>
+                <a:schemeClr val="accent1"/>
+              </a:buClr>
+              <a:buSzPct val="80000"/>
+              <a:buFont typeface="Wingdings 3" charset="2"/>
+              <a:buChar char=""/>
+              <a:defRPr sz="1600" kern="1200">
+                <a:solidFill>
+                  <a:schemeClr val="tx1">
+                    <a:lumMod val="75000"/>
+                    <a:lumOff val="25000"/>
+                  </a:schemeClr>
+                </a:solidFill>
+                <a:latin typeface="+mn-lt"/>
+                <a:ea typeface="+mn-ea"/>
+                <a:cs typeface="+mn-cs"/>
+              </a:defRPr>
+            </a:lvl2pPr>
+            <a:lvl3pPr marL="1143000" indent="-228600" algn="l" defTabSz="457200" rtl="0" eaLnBrk="1" latinLnBrk="0" hangingPunct="1">
+              <a:spcBef>
+                <a:spcPts val="1000"/>
+              </a:spcBef>
+              <a:spcAft>
+                <a:spcPts val="0"/>
+              </a:spcAft>
+              <a:buClr>
+                <a:schemeClr val="accent1"/>
+              </a:buClr>
+              <a:buSzPct val="80000"/>
+              <a:buFont typeface="Wingdings 3" charset="2"/>
+              <a:buChar char=""/>
+              <a:defRPr sz="1400" kern="1200">
+                <a:solidFill>
+                  <a:schemeClr val="tx1">
+                    <a:lumMod val="75000"/>
+                    <a:lumOff val="25000"/>
+                  </a:schemeClr>
+                </a:solidFill>
+                <a:latin typeface="+mn-lt"/>
+                <a:ea typeface="+mn-ea"/>
+                <a:cs typeface="+mn-cs"/>
+              </a:defRPr>
+            </a:lvl3pPr>
+            <a:lvl4pPr marL="1600200" indent="-228600" algn="l" defTabSz="457200" rtl="0" eaLnBrk="1" latinLnBrk="0" hangingPunct="1">
+              <a:spcBef>
+                <a:spcPts val="1000"/>
+              </a:spcBef>
+              <a:spcAft>
+                <a:spcPts val="0"/>
+              </a:spcAft>
+              <a:buClr>
+                <a:schemeClr val="accent1"/>
+              </a:buClr>
+              <a:buSzPct val="80000"/>
+              <a:buFont typeface="Wingdings 3" charset="2"/>
+              <a:buChar char=""/>
+              <a:defRPr sz="1200" kern="1200">
+                <a:solidFill>
+                  <a:schemeClr val="tx1">
+                    <a:lumMod val="75000"/>
+                    <a:lumOff val="25000"/>
+                  </a:schemeClr>
+                </a:solidFill>
+                <a:latin typeface="+mn-lt"/>
+                <a:ea typeface="+mn-ea"/>
+                <a:cs typeface="+mn-cs"/>
+              </a:defRPr>
+            </a:lvl4pPr>
+            <a:lvl5pPr marL="2057400" indent="-228600" algn="l" defTabSz="457200" rtl="0" eaLnBrk="1" latinLnBrk="0" hangingPunct="1">
+              <a:spcBef>
+                <a:spcPts val="1000"/>
+              </a:spcBef>
+              <a:spcAft>
+                <a:spcPts val="0"/>
+              </a:spcAft>
+              <a:buClr>
+                <a:schemeClr val="accent1"/>
+              </a:buClr>
+              <a:buSzPct val="80000"/>
+              <a:buFont typeface="Wingdings 3" charset="2"/>
+              <a:buChar char=""/>
+              <a:defRPr sz="1200" kern="1200">
+                <a:solidFill>
+                  <a:schemeClr val="tx1">
+                    <a:lumMod val="75000"/>
+                    <a:lumOff val="25000"/>
+                  </a:schemeClr>
+                </a:solidFill>
+                <a:latin typeface="+mn-lt"/>
+                <a:ea typeface="+mn-ea"/>
+                <a:cs typeface="+mn-cs"/>
+              </a:defRPr>
+            </a:lvl5pPr>
+            <a:lvl6pPr marL="2514600" indent="-228600" algn="l" defTabSz="457200" rtl="0" eaLnBrk="1" latinLnBrk="0" hangingPunct="1">
+              <a:spcBef>
+                <a:spcPts val="1000"/>
+              </a:spcBef>
+              <a:spcAft>
+                <a:spcPts val="0"/>
+              </a:spcAft>
+              <a:buClr>
+                <a:schemeClr val="accent1"/>
+              </a:buClr>
+              <a:buSzPct val="80000"/>
+              <a:buFont typeface="Wingdings 3" charset="2"/>
+              <a:buChar char=""/>
+              <a:defRPr sz="1200" kern="1200">
+                <a:solidFill>
+                  <a:schemeClr val="tx1">
+                    <a:lumMod val="75000"/>
+                    <a:lumOff val="25000"/>
+                  </a:schemeClr>
+                </a:solidFill>
+                <a:latin typeface="+mn-lt"/>
+                <a:ea typeface="+mn-ea"/>
+                <a:cs typeface="+mn-cs"/>
+              </a:defRPr>
+            </a:lvl6pPr>
+            <a:lvl7pPr marL="2971800" indent="-228600" algn="l" defTabSz="457200" rtl="0" eaLnBrk="1" latinLnBrk="0" hangingPunct="1">
+              <a:spcBef>
+                <a:spcPts val="1000"/>
+              </a:spcBef>
+              <a:spcAft>
+                <a:spcPts val="0"/>
+              </a:spcAft>
+              <a:buClr>
+                <a:schemeClr val="accent1"/>
+              </a:buClr>
+              <a:buSzPct val="80000"/>
+              <a:buFont typeface="Wingdings 3" charset="2"/>
+              <a:buChar char=""/>
+              <a:defRPr sz="1200" kern="1200">
+                <a:solidFill>
+                  <a:schemeClr val="tx1">
+                    <a:lumMod val="75000"/>
+                    <a:lumOff val="25000"/>
+                  </a:schemeClr>
+                </a:solidFill>
+                <a:latin typeface="+mn-lt"/>
+                <a:ea typeface="+mn-ea"/>
+                <a:cs typeface="+mn-cs"/>
+              </a:defRPr>
+            </a:lvl7pPr>
+            <a:lvl8pPr marL="3429000" indent="-228600" algn="l" defTabSz="457200" rtl="0" eaLnBrk="1" latinLnBrk="0" hangingPunct="1">
+              <a:spcBef>
+                <a:spcPts val="1000"/>
+              </a:spcBef>
+              <a:spcAft>
+                <a:spcPts val="0"/>
+              </a:spcAft>
+              <a:buClr>
+                <a:schemeClr val="accent1"/>
+              </a:buClr>
+              <a:buSzPct val="80000"/>
+              <a:buFont typeface="Wingdings 3" charset="2"/>
+              <a:buChar char=""/>
+              <a:defRPr sz="1200" kern="1200">
+                <a:solidFill>
+                  <a:schemeClr val="tx1">
+                    <a:lumMod val="75000"/>
+                    <a:lumOff val="25000"/>
+                  </a:schemeClr>
+                </a:solidFill>
+                <a:latin typeface="+mn-lt"/>
+                <a:ea typeface="+mn-ea"/>
+                <a:cs typeface="+mn-cs"/>
+              </a:defRPr>
+            </a:lvl8pPr>
+            <a:lvl9pPr marL="3886200" indent="-228600" algn="l" defTabSz="457200" rtl="0" eaLnBrk="1" latinLnBrk="0" hangingPunct="1">
+              <a:spcBef>
+                <a:spcPts val="1000"/>
+              </a:spcBef>
+              <a:spcAft>
+                <a:spcPts val="0"/>
+              </a:spcAft>
+              <a:buClr>
+                <a:schemeClr val="accent1"/>
+              </a:buClr>
+              <a:buSzPct val="80000"/>
+              <a:buFont typeface="Wingdings 3" charset="2"/>
+              <a:buChar char=""/>
+              <a:defRPr sz="1200" kern="1200">
+                <a:solidFill>
+                  <a:schemeClr val="tx1">
+                    <a:lumMod val="75000"/>
+                    <a:lumOff val="25000"/>
+                  </a:schemeClr>
+                </a:solidFill>
+                <a:latin typeface="+mn-lt"/>
+                <a:ea typeface="+mn-ea"/>
+                <a:cs typeface="+mn-cs"/>
+              </a:defRPr>
+            </a:lvl9pPr>
+          </a:lstStyle>
+          <a:p>
+            <a:r>
+              <a:rPr lang="en-US" dirty="0" err="1" smtClean="0"/>
+              <a:t>istream_iterator</a:t>
+            </a:r>
+            <a:r>
+              <a:rPr lang="en-US" dirty="0" smtClean="0"/>
+              <a:t> – </a:t>
+            </a:r>
+            <a:r>
+              <a:rPr lang="ru-RU" dirty="0" smtClean="0"/>
+              <a:t>итератор на поток ввода. Вместо присваивания значения с разыменовыванием выполняют извлечение из потока</a:t>
+            </a:r>
+            <a:endParaRPr lang="en-US" dirty="0"/>
+          </a:p>
+        </p:txBody>
+      </p:sp>
+      <p:sp>
+        <p:nvSpPr>
+          <p:cNvPr id="6" name="Объект 2"/>
+          <p:cNvSpPr txBox="1">
+            <a:spLocks/>
+          </p:cNvSpPr>
+          <p:nvPr/>
+        </p:nvSpPr>
+        <p:spPr>
+          <a:xfrm>
+            <a:off x="443057" y="5822887"/>
+            <a:ext cx="11491275" cy="727969"/>
+          </a:xfrm>
+          <a:prstGeom prst="rect">
+            <a:avLst/>
+          </a:prstGeom>
+          <a:solidFill>
+            <a:schemeClr val="bg1"/>
+          </a:solidFill>
+        </p:spPr>
+        <p:txBody>
+          <a:bodyPr vert="horz" lIns="91440" tIns="45720" rIns="91440" bIns="45720" rtlCol="0">
+            <a:normAutofit/>
+          </a:bodyPr>
+          <a:lstStyle>
+            <a:lvl1pPr marL="342900" indent="-342900" algn="l" defTabSz="457200" rtl="0" eaLnBrk="1" latinLnBrk="0" hangingPunct="1">
+              <a:spcBef>
+                <a:spcPts val="1000"/>
+              </a:spcBef>
+              <a:spcAft>
+                <a:spcPts val="0"/>
+              </a:spcAft>
+              <a:buClr>
+                <a:schemeClr val="accent1"/>
+              </a:buClr>
+              <a:buSzPct val="80000"/>
+              <a:buFont typeface="Wingdings 3" charset="2"/>
+              <a:buChar char=""/>
+              <a:defRPr sz="1800" kern="1200">
+                <a:solidFill>
+                  <a:schemeClr val="tx1">
+                    <a:lumMod val="75000"/>
+                    <a:lumOff val="25000"/>
+                  </a:schemeClr>
+                </a:solidFill>
+                <a:latin typeface="+mn-lt"/>
+                <a:ea typeface="+mn-ea"/>
+                <a:cs typeface="+mn-cs"/>
+              </a:defRPr>
+            </a:lvl1pPr>
+            <a:lvl2pPr marL="742950" indent="-285750" algn="l" defTabSz="457200" rtl="0" eaLnBrk="1" latinLnBrk="0" hangingPunct="1">
+              <a:spcBef>
+                <a:spcPts val="1000"/>
+              </a:spcBef>
+              <a:spcAft>
+                <a:spcPts val="0"/>
+              </a:spcAft>
+              <a:buClr>
+                <a:schemeClr val="accent1"/>
+              </a:buClr>
+              <a:buSzPct val="80000"/>
+              <a:buFont typeface="Wingdings 3" charset="2"/>
+              <a:buChar char=""/>
+              <a:defRPr sz="1600" kern="1200">
+                <a:solidFill>
+                  <a:schemeClr val="tx1">
+                    <a:lumMod val="75000"/>
+                    <a:lumOff val="25000"/>
+                  </a:schemeClr>
+                </a:solidFill>
+                <a:latin typeface="+mn-lt"/>
+                <a:ea typeface="+mn-ea"/>
+                <a:cs typeface="+mn-cs"/>
+              </a:defRPr>
+            </a:lvl2pPr>
+            <a:lvl3pPr marL="1143000" indent="-228600" algn="l" defTabSz="457200" rtl="0" eaLnBrk="1" latinLnBrk="0" hangingPunct="1">
+              <a:spcBef>
+                <a:spcPts val="1000"/>
+              </a:spcBef>
+              <a:spcAft>
+                <a:spcPts val="0"/>
+              </a:spcAft>
+              <a:buClr>
+                <a:schemeClr val="accent1"/>
+              </a:buClr>
+              <a:buSzPct val="80000"/>
+              <a:buFont typeface="Wingdings 3" charset="2"/>
+              <a:buChar char=""/>
+              <a:defRPr sz="1400" kern="1200">
+                <a:solidFill>
+                  <a:schemeClr val="tx1">
+                    <a:lumMod val="75000"/>
+                    <a:lumOff val="25000"/>
+                  </a:schemeClr>
+                </a:solidFill>
+                <a:latin typeface="+mn-lt"/>
+                <a:ea typeface="+mn-ea"/>
+                <a:cs typeface="+mn-cs"/>
+              </a:defRPr>
+            </a:lvl3pPr>
+            <a:lvl4pPr marL="1600200" indent="-228600" algn="l" defTabSz="457200" rtl="0" eaLnBrk="1" latinLnBrk="0" hangingPunct="1">
+              <a:spcBef>
+                <a:spcPts val="1000"/>
+              </a:spcBef>
+              <a:spcAft>
+                <a:spcPts val="0"/>
+              </a:spcAft>
+              <a:buClr>
+                <a:schemeClr val="accent1"/>
+              </a:buClr>
+              <a:buSzPct val="80000"/>
+              <a:buFont typeface="Wingdings 3" charset="2"/>
+              <a:buChar char=""/>
+              <a:defRPr sz="1200" kern="1200">
+                <a:solidFill>
+                  <a:schemeClr val="tx1">
+                    <a:lumMod val="75000"/>
+                    <a:lumOff val="25000"/>
+                  </a:schemeClr>
+                </a:solidFill>
+                <a:latin typeface="+mn-lt"/>
+                <a:ea typeface="+mn-ea"/>
+                <a:cs typeface="+mn-cs"/>
+              </a:defRPr>
+            </a:lvl4pPr>
+            <a:lvl5pPr marL="2057400" indent="-228600" algn="l" defTabSz="457200" rtl="0" eaLnBrk="1" latinLnBrk="0" hangingPunct="1">
+              <a:spcBef>
+                <a:spcPts val="1000"/>
+              </a:spcBef>
+              <a:spcAft>
+                <a:spcPts val="0"/>
+              </a:spcAft>
+              <a:buClr>
+                <a:schemeClr val="accent1"/>
+              </a:buClr>
+              <a:buSzPct val="80000"/>
+              <a:buFont typeface="Wingdings 3" charset="2"/>
+              <a:buChar char=""/>
+              <a:defRPr sz="1200" kern="1200">
+                <a:solidFill>
+                  <a:schemeClr val="tx1">
+                    <a:lumMod val="75000"/>
+                    <a:lumOff val="25000"/>
+                  </a:schemeClr>
+                </a:solidFill>
+                <a:latin typeface="+mn-lt"/>
+                <a:ea typeface="+mn-ea"/>
+                <a:cs typeface="+mn-cs"/>
+              </a:defRPr>
+            </a:lvl5pPr>
+            <a:lvl6pPr marL="2514600" indent="-228600" algn="l" defTabSz="457200" rtl="0" eaLnBrk="1" latinLnBrk="0" hangingPunct="1">
+              <a:spcBef>
+                <a:spcPts val="1000"/>
+              </a:spcBef>
+              <a:spcAft>
+                <a:spcPts val="0"/>
+              </a:spcAft>
+              <a:buClr>
+                <a:schemeClr val="accent1"/>
+              </a:buClr>
+              <a:buSzPct val="80000"/>
+              <a:buFont typeface="Wingdings 3" charset="2"/>
+              <a:buChar char=""/>
+              <a:defRPr sz="1200" kern="1200">
+                <a:solidFill>
+                  <a:schemeClr val="tx1">
+                    <a:lumMod val="75000"/>
+                    <a:lumOff val="25000"/>
+                  </a:schemeClr>
+                </a:solidFill>
+                <a:latin typeface="+mn-lt"/>
+                <a:ea typeface="+mn-ea"/>
+                <a:cs typeface="+mn-cs"/>
+              </a:defRPr>
+            </a:lvl6pPr>
+            <a:lvl7pPr marL="2971800" indent="-228600" algn="l" defTabSz="457200" rtl="0" eaLnBrk="1" latinLnBrk="0" hangingPunct="1">
+              <a:spcBef>
+                <a:spcPts val="1000"/>
+              </a:spcBef>
+              <a:spcAft>
+                <a:spcPts val="0"/>
+              </a:spcAft>
+              <a:buClr>
+                <a:schemeClr val="accent1"/>
+              </a:buClr>
+              <a:buSzPct val="80000"/>
+              <a:buFont typeface="Wingdings 3" charset="2"/>
+              <a:buChar char=""/>
+              <a:defRPr sz="1200" kern="1200">
+                <a:solidFill>
+                  <a:schemeClr val="tx1">
+                    <a:lumMod val="75000"/>
+                    <a:lumOff val="25000"/>
+                  </a:schemeClr>
+                </a:solidFill>
+                <a:latin typeface="+mn-lt"/>
+                <a:ea typeface="+mn-ea"/>
+                <a:cs typeface="+mn-cs"/>
+              </a:defRPr>
+            </a:lvl7pPr>
+            <a:lvl8pPr marL="3429000" indent="-228600" algn="l" defTabSz="457200" rtl="0" eaLnBrk="1" latinLnBrk="0" hangingPunct="1">
+              <a:spcBef>
+                <a:spcPts val="1000"/>
+              </a:spcBef>
+              <a:spcAft>
+                <a:spcPts val="0"/>
+              </a:spcAft>
+              <a:buClr>
+                <a:schemeClr val="accent1"/>
+              </a:buClr>
+              <a:buSzPct val="80000"/>
+              <a:buFont typeface="Wingdings 3" charset="2"/>
+              <a:buChar char=""/>
+              <a:defRPr sz="1200" kern="1200">
+                <a:solidFill>
+                  <a:schemeClr val="tx1">
+                    <a:lumMod val="75000"/>
+                    <a:lumOff val="25000"/>
+                  </a:schemeClr>
+                </a:solidFill>
+                <a:latin typeface="+mn-lt"/>
+                <a:ea typeface="+mn-ea"/>
+                <a:cs typeface="+mn-cs"/>
+              </a:defRPr>
+            </a:lvl8pPr>
+            <a:lvl9pPr marL="3886200" indent="-228600" algn="l" defTabSz="457200" rtl="0" eaLnBrk="1" latinLnBrk="0" hangingPunct="1">
+              <a:spcBef>
+                <a:spcPts val="1000"/>
+              </a:spcBef>
+              <a:spcAft>
+                <a:spcPts val="0"/>
+              </a:spcAft>
+              <a:buClr>
+                <a:schemeClr val="accent1"/>
+              </a:buClr>
+              <a:buSzPct val="80000"/>
+              <a:buFont typeface="Wingdings 3" charset="2"/>
+              <a:buChar char=""/>
+              <a:defRPr sz="1200" kern="1200">
+                <a:solidFill>
+                  <a:schemeClr val="tx1">
+                    <a:lumMod val="75000"/>
+                    <a:lumOff val="25000"/>
+                  </a:schemeClr>
+                </a:solidFill>
+                <a:latin typeface="+mn-lt"/>
+                <a:ea typeface="+mn-ea"/>
+                <a:cs typeface="+mn-cs"/>
+              </a:defRPr>
+            </a:lvl9pPr>
+          </a:lstStyle>
+          <a:p>
+            <a:r>
+              <a:rPr lang="ru-RU" dirty="0" smtClean="0"/>
+              <a:t>Работают как со стандартными потоками ввода/</a:t>
+            </a:r>
+            <a:r>
+              <a:rPr lang="ru-RU" dirty="0" err="1" smtClean="0"/>
+              <a:t>вывода,так</a:t>
+            </a:r>
+            <a:r>
+              <a:rPr lang="ru-RU" dirty="0" smtClean="0"/>
+              <a:t> и с файловыми потоками и с любыми другими типами, имеющими соответствующий интерфейс</a:t>
+            </a:r>
+            <a:endParaRPr lang="en-US" dirty="0"/>
+          </a:p>
+        </p:txBody>
+      </p:sp>
+      <p:pic>
+        <p:nvPicPr>
+          <p:cNvPr id="13" name="Рисунок 12"/>
+          <p:cNvPicPr>
+            <a:picLocks noChangeAspect="1"/>
+          </p:cNvPicPr>
+          <p:nvPr/>
+        </p:nvPicPr>
+        <p:blipFill>
+          <a:blip r:embed="rId2"/>
+          <a:stretch>
+            <a:fillRect/>
+          </a:stretch>
+        </p:blipFill>
+        <p:spPr>
+          <a:xfrm>
+            <a:off x="338771" y="2744465"/>
+            <a:ext cx="5452486" cy="1895836"/>
+          </a:xfrm>
+          <a:prstGeom prst="rect">
+            <a:avLst/>
+          </a:prstGeom>
+        </p:spPr>
+      </p:pic>
+      <p:pic>
+        <p:nvPicPr>
+          <p:cNvPr id="14" name="Рисунок 13"/>
+          <p:cNvPicPr>
+            <a:picLocks noChangeAspect="1"/>
+          </p:cNvPicPr>
+          <p:nvPr/>
+        </p:nvPicPr>
+        <p:blipFill>
+          <a:blip r:embed="rId3"/>
+          <a:stretch>
+            <a:fillRect/>
+          </a:stretch>
+        </p:blipFill>
+        <p:spPr>
+          <a:xfrm>
+            <a:off x="6427433" y="2525962"/>
+            <a:ext cx="5372668" cy="2114339"/>
+          </a:xfrm>
+          <a:prstGeom prst="rect">
+            <a:avLst/>
+          </a:prstGeom>
+        </p:spPr>
+      </p:pic>
+      <p:sp>
+        <p:nvSpPr>
+          <p:cNvPr id="15" name="TextBox 14"/>
+          <p:cNvSpPr txBox="1"/>
+          <p:nvPr/>
+        </p:nvSpPr>
+        <p:spPr>
+          <a:xfrm>
+            <a:off x="6525479" y="4819858"/>
+            <a:ext cx="5408853" cy="646331"/>
+          </a:xfrm>
+          <a:prstGeom prst="rect">
+            <a:avLst/>
+          </a:prstGeom>
+          <a:solidFill>
+            <a:schemeClr val="bg1"/>
+          </a:solidFill>
+        </p:spPr>
+        <p:txBody>
+          <a:bodyPr wrap="none" rtlCol="0">
+            <a:spAutoFit/>
+          </a:bodyPr>
+          <a:lstStyle/>
+          <a:p>
+            <a:r>
+              <a:rPr lang="ru-RU" dirty="0" smtClean="0"/>
+              <a:t>Равны если указывают на один и тот же поток и </a:t>
+            </a:r>
+          </a:p>
+          <a:p>
+            <a:r>
+              <a:rPr lang="ru-RU" dirty="0" smtClean="0"/>
+              <a:t>оба могут читать, либо если оба не могут читать</a:t>
+            </a:r>
             <a:endParaRPr lang="en-US" dirty="0"/>
           </a:p>
         </p:txBody>
@@ -6914,7 +8226,7 @@
     </p:spTree>
     <p:extLst>
       <p:ext uri="{BB962C8B-B14F-4D97-AF65-F5344CB8AC3E}">
-        <p14:creationId xmlns:p14="http://schemas.microsoft.com/office/powerpoint/2010/main" val="2207738432"/>
+        <p14:creationId xmlns:p14="http://schemas.microsoft.com/office/powerpoint/2010/main" val="128327706"/>
       </p:ext>
     </p:extLst>
   </p:cSld>
@@ -6954,71 +8266,73 @@
         <p:spPr>
           <a:xfrm>
             <a:off x="5269230" y="768461"/>
-            <a:ext cx="6665103" cy="2077609"/>
+            <a:ext cx="6665103" cy="5660914"/>
           </a:xfrm>
           <a:solidFill>
             <a:schemeClr val="bg1"/>
           </a:solidFill>
         </p:spPr>
         <p:txBody>
-          <a:bodyPr/>
+          <a:bodyPr>
+            <a:normAutofit/>
+          </a:bodyPr>
           <a:lstStyle/>
           <a:p>
             <a:r>
-              <a:rPr lang="ru-RU" dirty="0" smtClean="0"/>
+              <a:rPr lang="ru-RU" sz="2400" dirty="0" smtClean="0"/>
               <a:t>Кортеж (</a:t>
             </a:r>
             <a:r>
-              <a:rPr lang="en-US" dirty="0" smtClean="0"/>
+              <a:rPr lang="en-US" sz="2400" dirty="0" smtClean="0"/>
               <a:t>tuple</a:t>
             </a:r>
             <a:r>
-              <a:rPr lang="ru-RU" dirty="0" smtClean="0"/>
+              <a:rPr lang="ru-RU" sz="2400" dirty="0" smtClean="0"/>
               <a:t>)</a:t>
             </a:r>
             <a:r>
-              <a:rPr lang="en-US" dirty="0" smtClean="0"/>
+              <a:rPr lang="en-US" sz="2400" dirty="0" smtClean="0"/>
               <a:t> – </a:t>
             </a:r>
             <a:r>
-              <a:rPr lang="ru-RU" dirty="0" smtClean="0"/>
+              <a:rPr lang="ru-RU" sz="2400" dirty="0" smtClean="0"/>
               <a:t>коллекция фиксированного размера, которая может одновременно содержать элементы различных типов (как </a:t>
             </a:r>
             <a:r>
-              <a:rPr lang="en-US" dirty="0" err="1" smtClean="0"/>
+              <a:rPr lang="en-US" sz="2400" dirty="0" err="1" smtClean="0"/>
               <a:t>std</a:t>
             </a:r>
             <a:r>
-              <a:rPr lang="en-US" dirty="0" smtClean="0"/>
+              <a:rPr lang="en-US" sz="2400" dirty="0" smtClean="0"/>
               <a:t>::pair, </a:t>
             </a:r>
             <a:r>
-              <a:rPr lang="ru-RU" dirty="0" smtClean="0"/>
+              <a:rPr lang="ru-RU" sz="2400" dirty="0" smtClean="0"/>
               <a:t>только не для двух, а для произвольного числа элементов)</a:t>
             </a:r>
           </a:p>
           <a:p>
             <a:r>
-              <a:rPr lang="ru-RU" dirty="0" smtClean="0"/>
+              <a:rPr lang="ru-RU" sz="2400" dirty="0" smtClean="0"/>
               <a:t>Реализуется с помощью шаблонов с переменными числом параметров (</a:t>
             </a:r>
             <a:r>
-              <a:rPr lang="en-US" dirty="0" err="1" smtClean="0"/>
+              <a:rPr lang="en-US" sz="2400" dirty="0" err="1" smtClean="0"/>
               <a:t>variadic</a:t>
             </a:r>
             <a:r>
-              <a:rPr lang="en-US" dirty="0" smtClean="0"/>
+              <a:rPr lang="en-US" sz="2400" dirty="0" smtClean="0"/>
               <a:t> templates</a:t>
             </a:r>
             <a:r>
-              <a:rPr lang="ru-RU" dirty="0" smtClean="0"/>
+              <a:rPr lang="ru-RU" sz="2400" dirty="0" smtClean="0"/>
               <a:t>)</a:t>
             </a:r>
             <a:r>
-              <a:rPr lang="en-US" dirty="0" smtClean="0"/>
+              <a:rPr lang="en-US" sz="2400" dirty="0" smtClean="0"/>
               <a:t>. </a:t>
             </a:r>
-            <a:endParaRPr lang="en-US" dirty="0"/>
+            <a:endParaRPr lang="en-US" sz="2400" dirty="0"/>
           </a:p>
         </p:txBody>
       </p:sp>
@@ -7051,7 +8365,7 @@
           <p:cNvPr id="5" name="Title 1">
             <a:extLst>
               <a:ext uri="{FF2B5EF4-FFF2-40B4-BE49-F238E27FC236}">
-                <a16:creationId xmlns="" xmlns:a16="http://schemas.microsoft.com/office/drawing/2014/main" id="{C60BD838-89F7-4CB1-8B5E-1D5AD5FDEA16}"/>
+                <a16:creationId xmlns:a16="http://schemas.microsoft.com/office/drawing/2014/main" xmlns="" id="{C60BD838-89F7-4CB1-8B5E-1D5AD5FDEA16}"/>
               </a:ext>
             </a:extLst>
           </p:cNvPr>
@@ -7361,7 +8675,7 @@
           <p:cNvPr id="4" name="Title 1">
             <a:extLst>
               <a:ext uri="{FF2B5EF4-FFF2-40B4-BE49-F238E27FC236}">
-                <a16:creationId xmlns="" xmlns:a16="http://schemas.microsoft.com/office/drawing/2014/main" id="{C60BD838-89F7-4CB1-8B5E-1D5AD5FDEA16}"/>
+                <a16:creationId xmlns:a16="http://schemas.microsoft.com/office/drawing/2014/main" xmlns="" id="{C60BD838-89F7-4CB1-8B5E-1D5AD5FDEA16}"/>
               </a:ext>
             </a:extLst>
           </p:cNvPr>
@@ -7372,7 +8686,7 @@
         </p:nvSpPr>
         <p:spPr>
           <a:xfrm>
-            <a:off x="329938" y="128922"/>
+            <a:off x="339463" y="128922"/>
             <a:ext cx="11604395" cy="476150"/>
           </a:xfrm>
           <a:prstGeom prst="rect">
@@ -7467,7 +8781,7 @@
             <a:pPr algn="ctr"/>
             <a:r>
               <a:rPr lang="ru-RU" sz="2800" dirty="0" smtClean="0"/>
-              <a:t>Типы итераторов</a:t>
+              <a:t>Выбор контейнера</a:t>
             </a:r>
             <a:endParaRPr lang="en-US" sz="2800" dirty="0"/>
           </a:p>
@@ -7482,7 +8796,7 @@
           <p:nvPr>
             <p:extLst>
               <p:ext uri="{D42A27DB-BD31-4B8C-83A1-F6EECF244321}">
-                <p14:modId xmlns:p14="http://schemas.microsoft.com/office/powerpoint/2010/main" val="1529928411"/>
+                <p14:modId xmlns:p14="http://schemas.microsoft.com/office/powerpoint/2010/main" val="2383230684"/>
               </p:ext>
             </p:extLst>
           </p:nvPr>
@@ -7917,18 +9231,6 @@
                         <a:tabLst/>
                         <a:defRPr/>
                       </a:pPr>
-                      <a:r>
-                        <a:rPr lang="en-US" sz="1800" dirty="0" smtClean="0">
-                          <a:solidFill>
-                            <a:schemeClr val="accent2">
-                              <a:lumMod val="50000"/>
-                            </a:schemeClr>
-                          </a:solidFill>
-                          <a:latin typeface="Wingdings 2" panose="05020102010507070707" pitchFamily="18" charset="2"/>
-                          <a:sym typeface="Wingdings 2" panose="05020102010507070707" pitchFamily="18" charset="2"/>
-                        </a:rPr>
-                        <a:t></a:t>
-                      </a:r>
                       <a:endParaRPr lang="en-US" sz="1800" dirty="0" smtClean="0">
                         <a:solidFill>
                           <a:schemeClr val="accent2">
@@ -7962,18 +9264,6 @@
                         <a:tabLst/>
                         <a:defRPr/>
                       </a:pPr>
-                      <a:r>
-                        <a:rPr lang="en-US" sz="1800" dirty="0" smtClean="0">
-                          <a:solidFill>
-                            <a:schemeClr val="accent2">
-                              <a:lumMod val="50000"/>
-                            </a:schemeClr>
-                          </a:solidFill>
-                          <a:latin typeface="Wingdings 2" panose="05020102010507070707" pitchFamily="18" charset="2"/>
-                          <a:sym typeface="Wingdings 2" panose="05020102010507070707" pitchFamily="18" charset="2"/>
-                        </a:rPr>
-                        <a:t></a:t>
-                      </a:r>
                       <a:endParaRPr lang="en-US" sz="1800" dirty="0" smtClean="0">
                         <a:solidFill>
                           <a:schemeClr val="accent2">
@@ -8007,18 +9297,6 @@
                         <a:tabLst/>
                         <a:defRPr/>
                       </a:pPr>
-                      <a:r>
-                        <a:rPr lang="en-US" sz="1800" dirty="0" smtClean="0">
-                          <a:solidFill>
-                            <a:schemeClr val="accent2">
-                              <a:lumMod val="50000"/>
-                            </a:schemeClr>
-                          </a:solidFill>
-                          <a:latin typeface="Wingdings 2" panose="05020102010507070707" pitchFamily="18" charset="2"/>
-                          <a:sym typeface="Wingdings 2" panose="05020102010507070707" pitchFamily="18" charset="2"/>
-                        </a:rPr>
-                        <a:t></a:t>
-                      </a:r>
                       <a:endParaRPr lang="en-US" sz="1800" dirty="0" smtClean="0">
                         <a:solidFill>
                           <a:schemeClr val="accent2">
@@ -8052,18 +9330,6 @@
                         <a:tabLst/>
                         <a:defRPr/>
                       </a:pPr>
-                      <a:r>
-                        <a:rPr lang="en-US" sz="1800" dirty="0" smtClean="0">
-                          <a:solidFill>
-                            <a:schemeClr val="accent2">
-                              <a:lumMod val="50000"/>
-                            </a:schemeClr>
-                          </a:solidFill>
-                          <a:latin typeface="Wingdings 2" panose="05020102010507070707" pitchFamily="18" charset="2"/>
-                          <a:sym typeface="Wingdings 2" panose="05020102010507070707" pitchFamily="18" charset="2"/>
-                        </a:rPr>
-                        <a:t></a:t>
-                      </a:r>
                       <a:endParaRPr lang="en-US" sz="1800" dirty="0" smtClean="0">
                         <a:solidFill>
                           <a:schemeClr val="accent2">
@@ -8097,18 +9363,6 @@
                         <a:tabLst/>
                         <a:defRPr/>
                       </a:pPr>
-                      <a:r>
-                        <a:rPr lang="en-US" sz="1800" dirty="0" smtClean="0">
-                          <a:solidFill>
-                            <a:schemeClr val="accent2">
-                              <a:lumMod val="50000"/>
-                            </a:schemeClr>
-                          </a:solidFill>
-                          <a:latin typeface="Wingdings 2" panose="05020102010507070707" pitchFamily="18" charset="2"/>
-                          <a:sym typeface="Wingdings 2" panose="05020102010507070707" pitchFamily="18" charset="2"/>
-                        </a:rPr>
-                        <a:t></a:t>
-                      </a:r>
                       <a:endParaRPr lang="en-US" sz="1800" dirty="0" smtClean="0">
                         <a:solidFill>
                           <a:schemeClr val="accent2">
@@ -8143,11 +9397,11 @@
                         <a:defRPr/>
                       </a:pPr>
                       <a:r>
-                        <a:rPr lang="en-US" sz="1400" baseline="0" smtClean="0"/>
+                        <a:rPr lang="en-US" sz="1400" baseline="0" dirty="0" smtClean="0"/>
                         <a:t>set </a:t>
                       </a:r>
                       <a:r>
-                        <a:rPr lang="en-US" sz="1400" smtClean="0">
+                        <a:rPr lang="en-US" sz="1400" dirty="0" smtClean="0">
                           <a:solidFill>
                             <a:schemeClr val="accent5">
                               <a:lumMod val="75000"/>
@@ -8155,25 +9409,27 @@
                           </a:solidFill>
                           <a:sym typeface="Wingdings 2" panose="05020102010507070707" pitchFamily="18" charset="2"/>
                         </a:rPr>
-                        <a:t>    </a:t>
-                      </a:r>
-                      <a:r>
-                        <a:rPr lang="en-US" sz="1400" baseline="0" smtClean="0"/>
-                        <a:t>multiset </a:t>
-                      </a:r>
-                      <a:r>
-                        <a:rPr lang="en-US" sz="1400" smtClean="0">
+                        <a:t>    </a:t>
+                      </a:r>
+                      <a:r>
+                        <a:rPr lang="ru-RU" sz="1400" dirty="0" smtClean="0">
                           <a:solidFill>
-                            <a:schemeClr val="accent2">
-                              <a:lumMod val="50000"/>
+                            <a:schemeClr val="accent5">
+                              <a:lumMod val="75000"/>
                             </a:schemeClr>
                           </a:solidFill>
-                          <a:latin typeface="Wingdings 2" panose="05020102010507070707" pitchFamily="18" charset="2"/>
                           <a:sym typeface="Wingdings 2" panose="05020102010507070707" pitchFamily="18" charset="2"/>
                         </a:rPr>
-                        <a:t></a:t>
-                      </a:r>
-                      <a:endParaRPr lang="en-US" sz="1400" baseline="0" dirty="0" smtClean="0"/>
+                        <a:t>  </a:t>
+                      </a:r>
+                      <a:r>
+                        <a:rPr lang="en-US" sz="1400" baseline="0" dirty="0" err="1" smtClean="0"/>
+                        <a:t>multiset</a:t>
+                      </a:r>
+                      <a:r>
+                        <a:rPr lang="en-US" sz="1400" baseline="0" dirty="0" smtClean="0"/>
+                        <a:t> </a:t>
+                      </a:r>
                     </a:p>
                     <a:p>
                       <a:pPr marL="0" marR="0" lvl="0" indent="0" algn="l" defTabSz="457200" rtl="0" eaLnBrk="1" fontAlgn="auto" latinLnBrk="0" hangingPunct="1">
@@ -8194,11 +9450,11 @@
                         <a:defRPr/>
                       </a:pPr>
                       <a:r>
-                        <a:rPr lang="en-US" sz="1400" baseline="0" smtClean="0"/>
+                        <a:rPr lang="en-US" sz="1400" baseline="0" dirty="0" smtClean="0"/>
                         <a:t>map </a:t>
                       </a:r>
                       <a:r>
-                        <a:rPr lang="en-US" sz="1400" smtClean="0">
+                        <a:rPr lang="en-US" sz="1400" dirty="0" smtClean="0">
                           <a:solidFill>
                             <a:schemeClr val="accent5">
                               <a:lumMod val="75000"/>
@@ -8206,25 +9462,28 @@
                           </a:solidFill>
                           <a:sym typeface="Wingdings 2" panose="05020102010507070707" pitchFamily="18" charset="2"/>
                         </a:rPr>
-                        <a:t>  </a:t>
-                      </a:r>
-                      <a:r>
-                        <a:rPr lang="en-US" sz="1400" baseline="0" smtClean="0"/>
-                        <a:t>multimap </a:t>
-                      </a:r>
-                      <a:r>
-                        <a:rPr lang="en-US" sz="1800" smtClean="0">
+                        <a:t>  </a:t>
+                      </a:r>
+                      <a:r>
+                        <a:rPr lang="ru-RU" sz="1400" dirty="0" smtClean="0">
                           <a:solidFill>
-                            <a:schemeClr val="accent2">
-                              <a:lumMod val="50000"/>
+                            <a:schemeClr val="accent5">
+                              <a:lumMod val="75000"/>
                             </a:schemeClr>
                           </a:solidFill>
-                          <a:latin typeface="Wingdings 2" panose="05020102010507070707" pitchFamily="18" charset="2"/>
                           <a:sym typeface="Wingdings 2" panose="05020102010507070707" pitchFamily="18" charset="2"/>
                         </a:rPr>
-                        <a:t></a:t>
-                      </a:r>
-                      <a:endParaRPr lang="en-US" sz="1800" smtClean="0">
+                        <a:t>  </a:t>
+                      </a:r>
+                      <a:r>
+                        <a:rPr lang="en-US" sz="1400" baseline="0" dirty="0" err="1" smtClean="0"/>
+                        <a:t>multimap</a:t>
+                      </a:r>
+                      <a:r>
+                        <a:rPr lang="en-US" sz="1400" baseline="0" dirty="0" smtClean="0"/>
+                        <a:t> </a:t>
+                      </a:r>
+                      <a:endParaRPr lang="en-US" sz="1800" dirty="0" smtClean="0">
                         <a:solidFill>
                           <a:schemeClr val="accent2">
                             <a:lumMod val="50000"/>
@@ -8389,17 +9648,6 @@
                     <a:lstStyle/>
                     <a:p>
                       <a:pPr algn="ctr"/>
-                      <a:r>
-                        <a:rPr lang="en-US" sz="2400" dirty="0" smtClean="0">
-                          <a:solidFill>
-                            <a:schemeClr val="accent5">
-                              <a:lumMod val="75000"/>
-                            </a:schemeClr>
-                          </a:solidFill>
-                          <a:sym typeface="Wingdings 2" panose="05020102010507070707" pitchFamily="18" charset="2"/>
-                        </a:rPr>
-                        <a:t></a:t>
-                      </a:r>
                       <a:endParaRPr lang="en-US" sz="2400" dirty="0"/>
                     </a:p>
                   </a:txBody>
@@ -8813,18 +10061,6 @@
                         <a:tabLst/>
                         <a:defRPr/>
                       </a:pPr>
-                      <a:r>
-                        <a:rPr lang="en-US" sz="1400" dirty="0" smtClean="0">
-                          <a:solidFill>
-                            <a:schemeClr val="accent2">
-                              <a:lumMod val="50000"/>
-                            </a:schemeClr>
-                          </a:solidFill>
-                          <a:latin typeface="Wingdings 2" panose="05020102010507070707" pitchFamily="18" charset="2"/>
-                          <a:sym typeface="Wingdings 2" panose="05020102010507070707" pitchFamily="18" charset="2"/>
-                        </a:rPr>
-                        <a:t></a:t>
-                      </a:r>
                       <a:endParaRPr lang="en-US" sz="1400" dirty="0" smtClean="0">
                         <a:solidFill>
                           <a:schemeClr val="accent2">
@@ -8858,18 +10094,6 @@
                         <a:tabLst/>
                         <a:defRPr/>
                       </a:pPr>
-                      <a:r>
-                        <a:rPr lang="en-US" sz="1800" dirty="0" smtClean="0">
-                          <a:solidFill>
-                            <a:schemeClr val="accent2">
-                              <a:lumMod val="50000"/>
-                            </a:schemeClr>
-                          </a:solidFill>
-                          <a:latin typeface="Wingdings 2" panose="05020102010507070707" pitchFamily="18" charset="2"/>
-                          <a:sym typeface="Wingdings 2" panose="05020102010507070707" pitchFamily="18" charset="2"/>
-                        </a:rPr>
-                        <a:t></a:t>
-                      </a:r>
                       <a:endParaRPr lang="en-US" sz="1800" dirty="0" smtClean="0">
                         <a:solidFill>
                           <a:schemeClr val="accent2">
@@ -8903,18 +10127,6 @@
                         <a:tabLst/>
                         <a:defRPr/>
                       </a:pPr>
-                      <a:r>
-                        <a:rPr lang="en-US" sz="1800" dirty="0" smtClean="0">
-                          <a:solidFill>
-                            <a:schemeClr val="accent2">
-                              <a:lumMod val="50000"/>
-                            </a:schemeClr>
-                          </a:solidFill>
-                          <a:latin typeface="Wingdings 2" panose="05020102010507070707" pitchFamily="18" charset="2"/>
-                          <a:sym typeface="Wingdings 2" panose="05020102010507070707" pitchFamily="18" charset="2"/>
-                        </a:rPr>
-                        <a:t></a:t>
-                      </a:r>
                       <a:endParaRPr lang="en-US" sz="1800" dirty="0" smtClean="0">
                         <a:solidFill>
                           <a:schemeClr val="accent2">
@@ -8948,17 +10160,6 @@
                         <a:tabLst/>
                         <a:defRPr/>
                       </a:pPr>
-                      <a:r>
-                        <a:rPr lang="en-US" sz="1800" dirty="0" smtClean="0">
-                          <a:solidFill>
-                            <a:schemeClr val="accent5">
-                              <a:lumMod val="75000"/>
-                            </a:schemeClr>
-                          </a:solidFill>
-                          <a:sym typeface="Wingdings 2" panose="05020102010507070707" pitchFamily="18" charset="2"/>
-                        </a:rPr>
-                        <a:t></a:t>
-                      </a:r>
                       <a:endParaRPr lang="en-US" sz="1800" dirty="0" smtClean="0"/>
                     </a:p>
                   </a:txBody>
@@ -8986,17 +10187,6 @@
                         <a:tabLst/>
                         <a:defRPr/>
                       </a:pPr>
-                      <a:r>
-                        <a:rPr lang="en-US" sz="1800" dirty="0" smtClean="0">
-                          <a:solidFill>
-                            <a:schemeClr val="accent5">
-                              <a:lumMod val="75000"/>
-                            </a:schemeClr>
-                          </a:solidFill>
-                          <a:sym typeface="Wingdings 2" panose="05020102010507070707" pitchFamily="18" charset="2"/>
-                        </a:rPr>
-                        <a:t></a:t>
-                      </a:r>
                       <a:endParaRPr lang="en-US" sz="1800" dirty="0" smtClean="0"/>
                     </a:p>
                   </a:txBody>
@@ -9024,17 +10214,6 @@
                         <a:tabLst/>
                         <a:defRPr/>
                       </a:pPr>
-                      <a:r>
-                        <a:rPr lang="en-US" sz="1800" dirty="0" smtClean="0">
-                          <a:solidFill>
-                            <a:schemeClr val="accent5">
-                              <a:lumMod val="75000"/>
-                            </a:schemeClr>
-                          </a:solidFill>
-                          <a:sym typeface="Wingdings 2" panose="05020102010507070707" pitchFamily="18" charset="2"/>
-                        </a:rPr>
-                        <a:t></a:t>
-                      </a:r>
                       <a:endParaRPr lang="en-US" sz="1800" dirty="0" smtClean="0"/>
                     </a:p>
                   </a:txBody>
@@ -9060,6 +10239,570 @@
           </a:graphicData>
         </a:graphic>
       </p:graphicFrame>
+      <p:pic>
+        <p:nvPicPr>
+          <p:cNvPr id="3" name="Рисунок 2"/>
+          <p:cNvPicPr>
+            <a:picLocks noChangeAspect="1"/>
+          </p:cNvPicPr>
+          <p:nvPr/>
+        </p:nvPicPr>
+        <p:blipFill>
+          <a:blip r:embed="rId2" cstate="print">
+            <a:extLst>
+              <a:ext uri="{BEBA8EAE-BF5A-486C-A8C5-ECC9F3942E4B}">
+                <a14:imgProps xmlns:a14="http://schemas.microsoft.com/office/drawing/2010/main">
+                  <a14:imgLayer r:embed="rId3">
+                    <a14:imgEffect>
+                      <a14:backgroundRemoval t="0" b="99167" l="0" r="100000"/>
+                    </a14:imgEffect>
+                  </a14:imgLayer>
+                </a14:imgProps>
+              </a:ext>
+              <a:ext uri="{28A0092B-C50C-407E-A947-70E740481C1C}">
+                <a14:useLocalDpi xmlns:a14="http://schemas.microsoft.com/office/drawing/2010/main" val="0"/>
+              </a:ext>
+            </a:extLst>
+          </a:blip>
+          <a:stretch>
+            <a:fillRect/>
+          </a:stretch>
+        </p:blipFill>
+        <p:spPr>
+          <a:xfrm>
+            <a:off x="2247900" y="2661385"/>
+            <a:ext cx="409575" cy="468086"/>
+          </a:xfrm>
+          <a:prstGeom prst="rect">
+            <a:avLst/>
+          </a:prstGeom>
+        </p:spPr>
+      </p:pic>
+      <p:pic>
+        <p:nvPicPr>
+          <p:cNvPr id="6" name="Рисунок 5"/>
+          <p:cNvPicPr>
+            <a:picLocks noChangeAspect="1"/>
+          </p:cNvPicPr>
+          <p:nvPr/>
+        </p:nvPicPr>
+        <p:blipFill>
+          <a:blip r:embed="rId4" cstate="print">
+            <a:extLst>
+              <a:ext uri="{28A0092B-C50C-407E-A947-70E740481C1C}">
+                <a14:useLocalDpi xmlns:a14="http://schemas.microsoft.com/office/drawing/2010/main" val="0"/>
+              </a:ext>
+            </a:extLst>
+          </a:blip>
+          <a:stretch>
+            <a:fillRect/>
+          </a:stretch>
+        </p:blipFill>
+        <p:spPr>
+          <a:xfrm>
+            <a:off x="3714750" y="2661385"/>
+            <a:ext cx="409575" cy="468086"/>
+          </a:xfrm>
+          <a:prstGeom prst="rect">
+            <a:avLst/>
+          </a:prstGeom>
+        </p:spPr>
+      </p:pic>
+      <p:pic>
+        <p:nvPicPr>
+          <p:cNvPr id="7" name="Рисунок 6"/>
+          <p:cNvPicPr>
+            <a:picLocks noChangeAspect="1"/>
+          </p:cNvPicPr>
+          <p:nvPr/>
+        </p:nvPicPr>
+        <p:blipFill>
+          <a:blip r:embed="rId4" cstate="print">
+            <a:extLst>
+              <a:ext uri="{28A0092B-C50C-407E-A947-70E740481C1C}">
+                <a14:useLocalDpi xmlns:a14="http://schemas.microsoft.com/office/drawing/2010/main" val="0"/>
+              </a:ext>
+            </a:extLst>
+          </a:blip>
+          <a:stretch>
+            <a:fillRect/>
+          </a:stretch>
+        </p:blipFill>
+        <p:spPr>
+          <a:xfrm>
+            <a:off x="5181600" y="2661385"/>
+            <a:ext cx="409575" cy="468086"/>
+          </a:xfrm>
+          <a:prstGeom prst="rect">
+            <a:avLst/>
+          </a:prstGeom>
+        </p:spPr>
+      </p:pic>
+      <p:pic>
+        <p:nvPicPr>
+          <p:cNvPr id="8" name="Рисунок 7"/>
+          <p:cNvPicPr>
+            <a:picLocks noChangeAspect="1"/>
+          </p:cNvPicPr>
+          <p:nvPr/>
+        </p:nvPicPr>
+        <p:blipFill>
+          <a:blip r:embed="rId4" cstate="print">
+            <a:extLst>
+              <a:ext uri="{28A0092B-C50C-407E-A947-70E740481C1C}">
+                <a14:useLocalDpi xmlns:a14="http://schemas.microsoft.com/office/drawing/2010/main" val="0"/>
+              </a:ext>
+            </a:extLst>
+          </a:blip>
+          <a:stretch>
+            <a:fillRect/>
+          </a:stretch>
+        </p:blipFill>
+        <p:spPr>
+          <a:xfrm>
+            <a:off x="6648450" y="2661385"/>
+            <a:ext cx="409575" cy="468086"/>
+          </a:xfrm>
+          <a:prstGeom prst="rect">
+            <a:avLst/>
+          </a:prstGeom>
+        </p:spPr>
+      </p:pic>
+      <p:pic>
+        <p:nvPicPr>
+          <p:cNvPr id="9" name="Рисунок 8"/>
+          <p:cNvPicPr>
+            <a:picLocks noChangeAspect="1"/>
+          </p:cNvPicPr>
+          <p:nvPr/>
+        </p:nvPicPr>
+        <p:blipFill>
+          <a:blip r:embed="rId4" cstate="print">
+            <a:extLst>
+              <a:ext uri="{28A0092B-C50C-407E-A947-70E740481C1C}">
+                <a14:useLocalDpi xmlns:a14="http://schemas.microsoft.com/office/drawing/2010/main" val="0"/>
+              </a:ext>
+            </a:extLst>
+          </a:blip>
+          <a:stretch>
+            <a:fillRect/>
+          </a:stretch>
+        </p:blipFill>
+        <p:spPr>
+          <a:xfrm>
+            <a:off x="8086725" y="2661385"/>
+            <a:ext cx="409575" cy="468086"/>
+          </a:xfrm>
+          <a:prstGeom prst="rect">
+            <a:avLst/>
+          </a:prstGeom>
+        </p:spPr>
+      </p:pic>
+      <p:pic>
+        <p:nvPicPr>
+          <p:cNvPr id="10" name="Рисунок 9"/>
+          <p:cNvPicPr>
+            <a:picLocks noChangeAspect="1"/>
+          </p:cNvPicPr>
+          <p:nvPr/>
+        </p:nvPicPr>
+        <p:blipFill>
+          <a:blip r:embed="rId4" cstate="print">
+            <a:extLst>
+              <a:ext uri="{28A0092B-C50C-407E-A947-70E740481C1C}">
+                <a14:useLocalDpi xmlns:a14="http://schemas.microsoft.com/office/drawing/2010/main" val="0"/>
+              </a:ext>
+            </a:extLst>
+          </a:blip>
+          <a:stretch>
+            <a:fillRect/>
+          </a:stretch>
+        </p:blipFill>
+        <p:spPr>
+          <a:xfrm>
+            <a:off x="10363200" y="2661385"/>
+            <a:ext cx="171601" cy="196115"/>
+          </a:xfrm>
+          <a:prstGeom prst="rect">
+            <a:avLst/>
+          </a:prstGeom>
+        </p:spPr>
+      </p:pic>
+      <p:pic>
+        <p:nvPicPr>
+          <p:cNvPr id="11" name="Рисунок 10"/>
+          <p:cNvPicPr>
+            <a:picLocks noChangeAspect="1"/>
+          </p:cNvPicPr>
+          <p:nvPr/>
+        </p:nvPicPr>
+        <p:blipFill>
+          <a:blip r:embed="rId4" cstate="print">
+            <a:extLst>
+              <a:ext uri="{28A0092B-C50C-407E-A947-70E740481C1C}">
+                <a14:useLocalDpi xmlns:a14="http://schemas.microsoft.com/office/drawing/2010/main" val="0"/>
+              </a:ext>
+            </a:extLst>
+          </a:blip>
+          <a:stretch>
+            <a:fillRect/>
+          </a:stretch>
+        </p:blipFill>
+        <p:spPr>
+          <a:xfrm>
+            <a:off x="10449000" y="2904781"/>
+            <a:ext cx="171601" cy="196115"/>
+          </a:xfrm>
+          <a:prstGeom prst="rect">
+            <a:avLst/>
+          </a:prstGeom>
+        </p:spPr>
+      </p:pic>
+      <p:pic>
+        <p:nvPicPr>
+          <p:cNvPr id="13" name="Рисунок 12"/>
+          <p:cNvPicPr>
+            <a:picLocks noChangeAspect="1"/>
+          </p:cNvPicPr>
+          <p:nvPr/>
+        </p:nvPicPr>
+        <p:blipFill>
+          <a:blip r:embed="rId4" cstate="print">
+            <a:extLst>
+              <a:ext uri="{28A0092B-C50C-407E-A947-70E740481C1C}">
+                <a14:useLocalDpi xmlns:a14="http://schemas.microsoft.com/office/drawing/2010/main" val="0"/>
+              </a:ext>
+            </a:extLst>
+          </a:blip>
+          <a:stretch>
+            <a:fillRect/>
+          </a:stretch>
+        </p:blipFill>
+        <p:spPr>
+          <a:xfrm>
+            <a:off x="2247900" y="5737960"/>
+            <a:ext cx="409575" cy="468086"/>
+          </a:xfrm>
+          <a:prstGeom prst="rect">
+            <a:avLst/>
+          </a:prstGeom>
+        </p:spPr>
+      </p:pic>
+      <p:pic>
+        <p:nvPicPr>
+          <p:cNvPr id="14" name="Рисунок 13"/>
+          <p:cNvPicPr>
+            <a:picLocks noChangeAspect="1"/>
+          </p:cNvPicPr>
+          <p:nvPr/>
+        </p:nvPicPr>
+        <p:blipFill>
+          <a:blip r:embed="rId4" cstate="print">
+            <a:extLst>
+              <a:ext uri="{28A0092B-C50C-407E-A947-70E740481C1C}">
+                <a14:useLocalDpi xmlns:a14="http://schemas.microsoft.com/office/drawing/2010/main" val="0"/>
+              </a:ext>
+            </a:extLst>
+          </a:blip>
+          <a:stretch>
+            <a:fillRect/>
+          </a:stretch>
+        </p:blipFill>
+        <p:spPr>
+          <a:xfrm>
+            <a:off x="3714750" y="5737960"/>
+            <a:ext cx="409575" cy="468086"/>
+          </a:xfrm>
+          <a:prstGeom prst="rect">
+            <a:avLst/>
+          </a:prstGeom>
+        </p:spPr>
+      </p:pic>
+      <p:pic>
+        <p:nvPicPr>
+          <p:cNvPr id="15" name="Рисунок 14"/>
+          <p:cNvPicPr>
+            <a:picLocks noChangeAspect="1"/>
+          </p:cNvPicPr>
+          <p:nvPr/>
+        </p:nvPicPr>
+        <p:blipFill>
+          <a:blip r:embed="rId4" cstate="print">
+            <a:extLst>
+              <a:ext uri="{28A0092B-C50C-407E-A947-70E740481C1C}">
+                <a14:useLocalDpi xmlns:a14="http://schemas.microsoft.com/office/drawing/2010/main" val="0"/>
+              </a:ext>
+            </a:extLst>
+          </a:blip>
+          <a:stretch>
+            <a:fillRect/>
+          </a:stretch>
+        </p:blipFill>
+        <p:spPr>
+          <a:xfrm>
+            <a:off x="5181599" y="5737960"/>
+            <a:ext cx="409575" cy="468086"/>
+          </a:xfrm>
+          <a:prstGeom prst="rect">
+            <a:avLst/>
+          </a:prstGeom>
+        </p:spPr>
+      </p:pic>
+      <p:sp>
+        <p:nvSpPr>
+          <p:cNvPr id="16" name="AutoShape 2" descr="красный крестик скачать бесплатно - Красный крестик крестику Компьютерные  иконки клип-арт - Красный Крестик ПНГ"/>
+          <p:cNvSpPr>
+            <a:spLocks noChangeAspect="1" noChangeArrowheads="1"/>
+          </p:cNvSpPr>
+          <p:nvPr/>
+        </p:nvSpPr>
+        <p:spPr bwMode="auto">
+          <a:xfrm>
+            <a:off x="155575" y="-144463"/>
+            <a:ext cx="304800" cy="304801"/>
+          </a:xfrm>
+          <a:prstGeom prst="rect">
+            <a:avLst/>
+          </a:prstGeom>
+          <a:noFill/>
+          <a:extLst>
+            <a:ext uri="{909E8E84-426E-40DD-AFC4-6F175D3DCCD1}">
+              <a14:hiddenFill xmlns:a14="http://schemas.microsoft.com/office/drawing/2010/main">
+                <a:solidFill>
+                  <a:srgbClr val="FFFFFF"/>
+                </a:solidFill>
+              </a14:hiddenFill>
+            </a:ext>
+          </a:extLst>
+        </p:spPr>
+        <p:txBody>
+          <a:bodyPr vert="horz" wrap="square" lIns="91440" tIns="45720" rIns="91440" bIns="45720" numCol="1" anchor="t" anchorCtr="0" compatLnSpc="1">
+            <a:prstTxWarp prst="textNoShape">
+              <a:avLst/>
+            </a:prstTxWarp>
+          </a:bodyPr>
+          <a:lstStyle/>
+          <a:p>
+            <a:endParaRPr lang="en-US"/>
+          </a:p>
+        </p:txBody>
+      </p:sp>
+      <p:pic>
+        <p:nvPicPr>
+          <p:cNvPr id="17" name="Рисунок 16"/>
+          <p:cNvPicPr>
+            <a:picLocks noChangeAspect="1"/>
+          </p:cNvPicPr>
+          <p:nvPr/>
+        </p:nvPicPr>
+        <p:blipFill>
+          <a:blip r:embed="rId5" cstate="print">
+            <a:extLst>
+              <a:ext uri="{BEBA8EAE-BF5A-486C-A8C5-ECC9F3942E4B}">
+                <a14:imgProps xmlns:a14="http://schemas.microsoft.com/office/drawing/2010/main">
+                  <a14:imgLayer r:embed="rId6">
+                    <a14:imgEffect>
+                      <a14:backgroundRemoval t="10000" b="90000" l="10000" r="90000"/>
+                    </a14:imgEffect>
+                    <a14:imgEffect>
+                      <a14:saturation sat="66000"/>
+                    </a14:imgEffect>
+                  </a14:imgLayer>
+                </a14:imgProps>
+              </a:ext>
+              <a:ext uri="{28A0092B-C50C-407E-A947-70E740481C1C}">
+                <a14:useLocalDpi xmlns:a14="http://schemas.microsoft.com/office/drawing/2010/main" val="0"/>
+              </a:ext>
+            </a:extLst>
+          </a:blip>
+          <a:stretch>
+            <a:fillRect/>
+          </a:stretch>
+        </p:blipFill>
+        <p:spPr>
+          <a:xfrm>
+            <a:off x="9210674" y="2734777"/>
+            <a:ext cx="219075" cy="219075"/>
+          </a:xfrm>
+          <a:prstGeom prst="rect">
+            <a:avLst/>
+          </a:prstGeom>
+        </p:spPr>
+      </p:pic>
+      <p:pic>
+        <p:nvPicPr>
+          <p:cNvPr id="18" name="Рисунок 17"/>
+          <p:cNvPicPr>
+            <a:picLocks noChangeAspect="1"/>
+          </p:cNvPicPr>
+          <p:nvPr/>
+        </p:nvPicPr>
+        <p:blipFill>
+          <a:blip r:embed="rId5" cstate="print">
+            <a:extLst>
+              <a:ext uri="{BEBA8EAE-BF5A-486C-A8C5-ECC9F3942E4B}">
+                <a14:imgProps xmlns:a14="http://schemas.microsoft.com/office/drawing/2010/main">
+                  <a14:imgLayer r:embed="rId6">
+                    <a14:imgEffect>
+                      <a14:backgroundRemoval t="10000" b="90000" l="10000" r="90000"/>
+                    </a14:imgEffect>
+                    <a14:imgEffect>
+                      <a14:saturation sat="66000"/>
+                    </a14:imgEffect>
+                  </a14:imgLayer>
+                </a14:imgProps>
+              </a:ext>
+              <a:ext uri="{28A0092B-C50C-407E-A947-70E740481C1C}">
+                <a14:useLocalDpi xmlns:a14="http://schemas.microsoft.com/office/drawing/2010/main" val="0"/>
+              </a:ext>
+            </a:extLst>
+          </a:blip>
+          <a:stretch>
+            <a:fillRect/>
+          </a:stretch>
+        </p:blipFill>
+        <p:spPr>
+          <a:xfrm>
+            <a:off x="9282110" y="2953852"/>
+            <a:ext cx="219075" cy="219075"/>
+          </a:xfrm>
+          <a:prstGeom prst="rect">
+            <a:avLst/>
+          </a:prstGeom>
+        </p:spPr>
+      </p:pic>
+      <p:pic>
+        <p:nvPicPr>
+          <p:cNvPr id="19" name="Рисунок 18"/>
+          <p:cNvPicPr>
+            <a:picLocks noChangeAspect="1"/>
+          </p:cNvPicPr>
+          <p:nvPr/>
+        </p:nvPicPr>
+        <p:blipFill>
+          <a:blip r:embed="rId7" cstate="print">
+            <a:extLst>
+              <a:ext uri="{BEBA8EAE-BF5A-486C-A8C5-ECC9F3942E4B}">
+                <a14:imgProps xmlns:a14="http://schemas.microsoft.com/office/drawing/2010/main">
+                  <a14:imgLayer r:embed="rId6">
+                    <a14:imgEffect>
+                      <a14:backgroundRemoval t="10000" b="90000" l="10000" r="90000"/>
+                    </a14:imgEffect>
+                    <a14:imgEffect>
+                      <a14:saturation sat="33000"/>
+                    </a14:imgEffect>
+                  </a14:imgLayer>
+                </a14:imgProps>
+              </a:ext>
+              <a:ext uri="{28A0092B-C50C-407E-A947-70E740481C1C}">
+                <a14:useLocalDpi xmlns:a14="http://schemas.microsoft.com/office/drawing/2010/main" val="0"/>
+              </a:ext>
+            </a:extLst>
+          </a:blip>
+          <a:stretch>
+            <a:fillRect/>
+          </a:stretch>
+        </p:blipFill>
+        <p:spPr>
+          <a:xfrm>
+            <a:off x="2247900" y="4138440"/>
+            <a:ext cx="519113" cy="519113"/>
+          </a:xfrm>
+          <a:prstGeom prst="rect">
+            <a:avLst/>
+          </a:prstGeom>
+        </p:spPr>
+      </p:pic>
+      <p:pic>
+        <p:nvPicPr>
+          <p:cNvPr id="20" name="Рисунок 19"/>
+          <p:cNvPicPr>
+            <a:picLocks noChangeAspect="1"/>
+          </p:cNvPicPr>
+          <p:nvPr/>
+        </p:nvPicPr>
+        <p:blipFill>
+          <a:blip r:embed="rId8" cstate="print">
+            <a:extLst>
+              <a:ext uri="{28A0092B-C50C-407E-A947-70E740481C1C}">
+                <a14:useLocalDpi xmlns:a14="http://schemas.microsoft.com/office/drawing/2010/main" val="0"/>
+              </a:ext>
+            </a:extLst>
+          </a:blip>
+          <a:stretch>
+            <a:fillRect/>
+          </a:stretch>
+        </p:blipFill>
+        <p:spPr>
+          <a:xfrm>
+            <a:off x="6593680" y="5712446"/>
+            <a:ext cx="519113" cy="519113"/>
+          </a:xfrm>
+          <a:prstGeom prst="rect">
+            <a:avLst/>
+          </a:prstGeom>
+        </p:spPr>
+      </p:pic>
+      <p:pic>
+        <p:nvPicPr>
+          <p:cNvPr id="21" name="Рисунок 20"/>
+          <p:cNvPicPr>
+            <a:picLocks noChangeAspect="1"/>
+          </p:cNvPicPr>
+          <p:nvPr/>
+        </p:nvPicPr>
+        <p:blipFill>
+          <a:blip r:embed="rId8" cstate="print">
+            <a:extLst>
+              <a:ext uri="{28A0092B-C50C-407E-A947-70E740481C1C}">
+                <a14:useLocalDpi xmlns:a14="http://schemas.microsoft.com/office/drawing/2010/main" val="0"/>
+              </a:ext>
+            </a:extLst>
+          </a:blip>
+          <a:stretch>
+            <a:fillRect/>
+          </a:stretch>
+        </p:blipFill>
+        <p:spPr>
+          <a:xfrm>
+            <a:off x="7855742" y="5719417"/>
+            <a:ext cx="519113" cy="519113"/>
+          </a:xfrm>
+          <a:prstGeom prst="rect">
+            <a:avLst/>
+          </a:prstGeom>
+        </p:spPr>
+      </p:pic>
+      <p:pic>
+        <p:nvPicPr>
+          <p:cNvPr id="22" name="Рисунок 21"/>
+          <p:cNvPicPr>
+            <a:picLocks noChangeAspect="1"/>
+          </p:cNvPicPr>
+          <p:nvPr/>
+        </p:nvPicPr>
+        <p:blipFill>
+          <a:blip r:embed="rId8" cstate="print">
+            <a:extLst>
+              <a:ext uri="{28A0092B-C50C-407E-A947-70E740481C1C}">
+                <a14:useLocalDpi xmlns:a14="http://schemas.microsoft.com/office/drawing/2010/main" val="0"/>
+              </a:ext>
+            </a:extLst>
+          </a:blip>
+          <a:stretch>
+            <a:fillRect/>
+          </a:stretch>
+        </p:blipFill>
+        <p:spPr>
+          <a:xfrm>
+            <a:off x="9429749" y="5719417"/>
+            <a:ext cx="519113" cy="519113"/>
+          </a:xfrm>
+          <a:prstGeom prst="rect">
+            <a:avLst/>
+          </a:prstGeom>
+        </p:spPr>
+      </p:pic>
     </p:spTree>
     <p:extLst>
       <p:ext uri="{BB962C8B-B14F-4D97-AF65-F5344CB8AC3E}">
@@ -9201,7 +10944,7 @@
           <p:cNvPr id="4" name="Title 1">
             <a:extLst>
               <a:ext uri="{FF2B5EF4-FFF2-40B4-BE49-F238E27FC236}">
-                <a16:creationId xmlns="" xmlns:a16="http://schemas.microsoft.com/office/drawing/2014/main" id="{C60BD838-89F7-4CB1-8B5E-1D5AD5FDEA16}"/>
+                <a16:creationId xmlns:a16="http://schemas.microsoft.com/office/drawing/2014/main" xmlns="" id="{C60BD838-89F7-4CB1-8B5E-1D5AD5FDEA16}"/>
               </a:ext>
             </a:extLst>
           </p:cNvPr>
@@ -9342,7 +11085,7 @@
           <p:cNvPr id="7" name="Picture 3">
             <a:extLst>
               <a:ext uri="{FF2B5EF4-FFF2-40B4-BE49-F238E27FC236}">
-                <a16:creationId xmlns="" xmlns:a16="http://schemas.microsoft.com/office/drawing/2014/main" id="{427BFC14-A2B9-4CB6-BE1C-0C70EF19CA05}"/>
+                <a16:creationId xmlns:a16="http://schemas.microsoft.com/office/drawing/2014/main" xmlns="" id="{427BFC14-A2B9-4CB6-BE1C-0C70EF19CA05}"/>
               </a:ext>
             </a:extLst>
           </p:cNvPr>
@@ -9401,7 +11144,7 @@
           <p:cNvPr id="4" name="Title 1">
             <a:extLst>
               <a:ext uri="{FF2B5EF4-FFF2-40B4-BE49-F238E27FC236}">
-                <a16:creationId xmlns="" xmlns:a16="http://schemas.microsoft.com/office/drawing/2014/main" id="{C60BD838-89F7-4CB1-8B5E-1D5AD5FDEA16}"/>
+                <a16:creationId xmlns:a16="http://schemas.microsoft.com/office/drawing/2014/main" xmlns="" id="{C60BD838-89F7-4CB1-8B5E-1D5AD5FDEA16}"/>
               </a:ext>
             </a:extLst>
           </p:cNvPr>
@@ -9530,7 +11273,7 @@
           <p:cNvPr id="12" name="Table 11">
             <a:extLst>
               <a:ext uri="{FF2B5EF4-FFF2-40B4-BE49-F238E27FC236}">
-                <a16:creationId xmlns="" xmlns:a16="http://schemas.microsoft.com/office/drawing/2014/main" id="{CCE7D441-96BC-4D6A-BE32-CEC98DB5865D}"/>
+                <a16:creationId xmlns:a16="http://schemas.microsoft.com/office/drawing/2014/main" xmlns="" id="{CCE7D441-96BC-4D6A-BE32-CEC98DB5865D}"/>
               </a:ext>
             </a:extLst>
           </p:cNvPr>
@@ -9540,7 +11283,7 @@
           <p:nvPr>
             <p:extLst>
               <p:ext uri="{D42A27DB-BD31-4B8C-83A1-F6EECF244321}">
-                <p14:modId xmlns:p14="http://schemas.microsoft.com/office/powerpoint/2010/main" val="1880072436"/>
+                <p14:modId xmlns:p14="http://schemas.microsoft.com/office/powerpoint/2010/main" val="2017866981"/>
               </p:ext>
             </p:extLst>
           </p:nvPr>
@@ -9559,28 +11302,28 @@
                 <a:gridCol w="3440783">
                   <a:extLst>
                     <a:ext uri="{9D8B030D-6E8A-4147-A177-3AD203B41FA5}">
-                      <a16:colId xmlns="" xmlns:a16="http://schemas.microsoft.com/office/drawing/2014/main" val="673896950"/>
+                      <a16:colId xmlns:a16="http://schemas.microsoft.com/office/drawing/2014/main" xmlns="" val="673896950"/>
                     </a:ext>
                   </a:extLst>
                 </a:gridCol>
                 <a:gridCol w="2554664">
                   <a:extLst>
                     <a:ext uri="{9D8B030D-6E8A-4147-A177-3AD203B41FA5}">
-                      <a16:colId xmlns="" xmlns:a16="http://schemas.microsoft.com/office/drawing/2014/main" val="3404116454"/>
+                      <a16:colId xmlns:a16="http://schemas.microsoft.com/office/drawing/2014/main" xmlns="" val="3404116454"/>
                     </a:ext>
                   </a:extLst>
                 </a:gridCol>
                 <a:gridCol w="2790334">
                   <a:extLst>
                     <a:ext uri="{9D8B030D-6E8A-4147-A177-3AD203B41FA5}">
-                      <a16:colId xmlns="" xmlns:a16="http://schemas.microsoft.com/office/drawing/2014/main" val="2546970233"/>
+                      <a16:colId xmlns:a16="http://schemas.microsoft.com/office/drawing/2014/main" xmlns="" val="2546970233"/>
                     </a:ext>
                   </a:extLst>
                 </a:gridCol>
                 <a:gridCol w="2686638">
                   <a:extLst>
                     <a:ext uri="{9D8B030D-6E8A-4147-A177-3AD203B41FA5}">
-                      <a16:colId xmlns="" xmlns:a16="http://schemas.microsoft.com/office/drawing/2014/main" val="1905818927"/>
+                      <a16:colId xmlns:a16="http://schemas.microsoft.com/office/drawing/2014/main" xmlns="" val="1905818927"/>
                     </a:ext>
                   </a:extLst>
                 </a:gridCol>
@@ -9644,7 +11387,7 @@
                 </a:tc>
                 <a:extLst>
                   <a:ext uri="{0D108BD9-81ED-4DB2-BD59-A6C34878D82A}">
-                    <a16:rowId xmlns="" xmlns:a16="http://schemas.microsoft.com/office/drawing/2014/main" val="3707840138"/>
+                    <a16:rowId xmlns:a16="http://schemas.microsoft.com/office/drawing/2014/main" xmlns="" val="3707840138"/>
                   </a:ext>
                 </a:extLst>
               </a:tr>
@@ -9716,18 +11459,6 @@
                     <a:lstStyle/>
                     <a:p>
                       <a:pPr algn="ctr"/>
-                      <a:r>
-                        <a:rPr lang="en-US" sz="3200" dirty="0">
-                          <a:solidFill>
-                            <a:schemeClr val="accent2">
-                              <a:lumMod val="50000"/>
-                            </a:schemeClr>
-                          </a:solidFill>
-                          <a:latin typeface="Wingdings 2" panose="05020102010507070707" pitchFamily="18" charset="2"/>
-                          <a:sym typeface="Wingdings 2" panose="05020102010507070707" pitchFamily="18" charset="2"/>
-                        </a:rPr>
-                        <a:t></a:t>
-                      </a:r>
                       <a:endParaRPr lang="ru-RU" sz="3200" dirty="0">
                         <a:solidFill>
                           <a:schemeClr val="accent2">
@@ -9781,17 +11512,6 @@
                         <a:tabLst/>
                         <a:defRPr/>
                       </a:pPr>
-                      <a:r>
-                        <a:rPr lang="en-US" sz="3200" dirty="0">
-                          <a:solidFill>
-                            <a:schemeClr val="accent5">
-                              <a:lumMod val="75000"/>
-                            </a:schemeClr>
-                          </a:solidFill>
-                          <a:sym typeface="Wingdings 2" panose="05020102010507070707" pitchFamily="18" charset="2"/>
-                        </a:rPr>
-                        <a:t></a:t>
-                      </a:r>
                       <a:endParaRPr lang="ru-RU" sz="3200" dirty="0">
                         <a:solidFill>
                           <a:schemeClr val="accent5">
@@ -9834,7 +11554,7 @@
                 </a:tc>
                 <a:extLst>
                   <a:ext uri="{0D108BD9-81ED-4DB2-BD59-A6C34878D82A}">
-                    <a16:rowId xmlns="" xmlns:a16="http://schemas.microsoft.com/office/drawing/2014/main" val="541336909"/>
+                    <a16:rowId xmlns:a16="http://schemas.microsoft.com/office/drawing/2014/main" xmlns="" val="541336909"/>
                   </a:ext>
                 </a:extLst>
               </a:tr>
@@ -9920,18 +11640,6 @@
                     <a:lstStyle/>
                     <a:p>
                       <a:pPr algn="ctr"/>
-                      <a:r>
-                        <a:rPr lang="en-US" sz="3200" dirty="0">
-                          <a:solidFill>
-                            <a:schemeClr val="accent2">
-                              <a:lumMod val="50000"/>
-                            </a:schemeClr>
-                          </a:solidFill>
-                          <a:latin typeface="Wingdings 2" panose="05020102010507070707" pitchFamily="18" charset="2"/>
-                          <a:sym typeface="Wingdings 2" panose="05020102010507070707" pitchFamily="18" charset="2"/>
-                        </a:rPr>
-                        <a:t></a:t>
-                      </a:r>
                       <a:endParaRPr lang="en-US" sz="3200" dirty="0">
                         <a:solidFill>
                           <a:schemeClr val="accent2">
@@ -9949,18 +11657,6 @@
                     <a:lstStyle/>
                     <a:p>
                       <a:pPr algn="ctr"/>
-                      <a:r>
-                        <a:rPr lang="en-US" sz="3200" dirty="0">
-                          <a:solidFill>
-                            <a:schemeClr val="accent2">
-                              <a:lumMod val="50000"/>
-                            </a:schemeClr>
-                          </a:solidFill>
-                          <a:latin typeface="Wingdings 2" panose="05020102010507070707" pitchFamily="18" charset="2"/>
-                          <a:sym typeface="Wingdings 2" panose="05020102010507070707" pitchFamily="18" charset="2"/>
-                        </a:rPr>
-                        <a:t></a:t>
-                      </a:r>
                       <a:endParaRPr lang="en-US" sz="3200" dirty="0">
                         <a:solidFill>
                           <a:schemeClr val="accent2">
@@ -9975,7 +11671,7 @@
                 </a:tc>
                 <a:extLst>
                   <a:ext uri="{0D108BD9-81ED-4DB2-BD59-A6C34878D82A}">
-                    <a16:rowId xmlns="" xmlns:a16="http://schemas.microsoft.com/office/drawing/2014/main" val="2595382089"/>
+                    <a16:rowId xmlns:a16="http://schemas.microsoft.com/office/drawing/2014/main" xmlns="" val="2595382089"/>
                   </a:ext>
                 </a:extLst>
               </a:tr>
@@ -10051,18 +11747,6 @@
                     <a:lstStyle/>
                     <a:p>
                       <a:pPr algn="ctr"/>
-                      <a:r>
-                        <a:rPr lang="en-US" sz="3200" dirty="0">
-                          <a:solidFill>
-                            <a:schemeClr val="accent2">
-                              <a:lumMod val="50000"/>
-                            </a:schemeClr>
-                          </a:solidFill>
-                          <a:latin typeface="Wingdings 2" panose="05020102010507070707" pitchFamily="18" charset="2"/>
-                          <a:sym typeface="Wingdings 2" panose="05020102010507070707" pitchFamily="18" charset="2"/>
-                        </a:rPr>
-                        <a:t></a:t>
-                      </a:r>
                       <a:endParaRPr lang="ru-RU" sz="3200" dirty="0">
                         <a:solidFill>
                           <a:schemeClr val="accent2">
@@ -10118,17 +11802,6 @@
                         <a:tabLst/>
                         <a:defRPr/>
                       </a:pPr>
-                      <a:r>
-                        <a:rPr lang="en-US" sz="3200" dirty="0">
-                          <a:solidFill>
-                            <a:schemeClr val="accent5">
-                              <a:lumMod val="75000"/>
-                            </a:schemeClr>
-                          </a:solidFill>
-                          <a:sym typeface="Wingdings 2" panose="05020102010507070707" pitchFamily="18" charset="2"/>
-                        </a:rPr>
-                        <a:t></a:t>
-                      </a:r>
                       <a:endParaRPr lang="en-US" sz="3200" dirty="0">
                         <a:solidFill>
                           <a:schemeClr val="accent5">
@@ -10152,7 +11825,7 @@
                 </a:tc>
                 <a:extLst>
                   <a:ext uri="{0D108BD9-81ED-4DB2-BD59-A6C34878D82A}">
-                    <a16:rowId xmlns="" xmlns:a16="http://schemas.microsoft.com/office/drawing/2014/main" val="1389121230"/>
+                    <a16:rowId xmlns:a16="http://schemas.microsoft.com/office/drawing/2014/main" xmlns="" val="1389121230"/>
                   </a:ext>
                 </a:extLst>
               </a:tr>
@@ -10226,17 +11899,6 @@
                     <a:lstStyle/>
                     <a:p>
                       <a:pPr algn="ctr"/>
-                      <a:r>
-                        <a:rPr lang="en-US" sz="3200" dirty="0">
-                          <a:solidFill>
-                            <a:schemeClr val="accent5">
-                              <a:lumMod val="75000"/>
-                            </a:schemeClr>
-                          </a:solidFill>
-                          <a:sym typeface="Wingdings 2" panose="05020102010507070707" pitchFamily="18" charset="2"/>
-                        </a:rPr>
-                        <a:t></a:t>
-                      </a:r>
                       <a:endParaRPr lang="en-US" sz="3200" dirty="0">
                         <a:solidFill>
                           <a:schemeClr val="accent5">
@@ -10254,18 +11916,6 @@
                     <a:lstStyle/>
                     <a:p>
                       <a:pPr algn="ctr"/>
-                      <a:r>
-                        <a:rPr lang="en-US" sz="3200" dirty="0">
-                          <a:solidFill>
-                            <a:schemeClr val="accent2">
-                              <a:lumMod val="50000"/>
-                            </a:schemeClr>
-                          </a:solidFill>
-                          <a:latin typeface="Wingdings 2" panose="05020102010507070707" pitchFamily="18" charset="2"/>
-                          <a:sym typeface="Wingdings 2" panose="05020102010507070707" pitchFamily="18" charset="2"/>
-                        </a:rPr>
-                        <a:t></a:t>
-                      </a:r>
                       <a:endParaRPr lang="ru-RU" sz="3200" dirty="0">
                         <a:solidFill>
                           <a:schemeClr val="accent2">
@@ -10304,7 +11954,7 @@
                 </a:tc>
                 <a:extLst>
                   <a:ext uri="{0D108BD9-81ED-4DB2-BD59-A6C34878D82A}">
-                    <a16:rowId xmlns="" xmlns:a16="http://schemas.microsoft.com/office/drawing/2014/main" val="4012556742"/>
+                    <a16:rowId xmlns:a16="http://schemas.microsoft.com/office/drawing/2014/main" xmlns="" val="4012556742"/>
                   </a:ext>
                 </a:extLst>
               </a:tr>
@@ -10312,6 +11962,246 @@
           </a:graphicData>
         </a:graphic>
       </p:graphicFrame>
+      <p:pic>
+        <p:nvPicPr>
+          <p:cNvPr id="5" name="Рисунок 4"/>
+          <p:cNvPicPr>
+            <a:picLocks noChangeAspect="1"/>
+          </p:cNvPicPr>
+          <p:nvPr/>
+        </p:nvPicPr>
+        <p:blipFill>
+          <a:blip r:embed="rId2" cstate="print">
+            <a:extLst>
+              <a:ext uri="{28A0092B-C50C-407E-A947-70E740481C1C}">
+                <a14:useLocalDpi xmlns:a14="http://schemas.microsoft.com/office/drawing/2010/main" val="0"/>
+              </a:ext>
+            </a:extLst>
+          </a:blip>
+          <a:stretch>
+            <a:fillRect/>
+          </a:stretch>
+        </p:blipFill>
+        <p:spPr>
+          <a:xfrm>
+            <a:off x="10296525" y="1157115"/>
+            <a:ext cx="519113" cy="519113"/>
+          </a:xfrm>
+          <a:prstGeom prst="rect">
+            <a:avLst/>
+          </a:prstGeom>
+        </p:spPr>
+      </p:pic>
+      <p:pic>
+        <p:nvPicPr>
+          <p:cNvPr id="6" name="Рисунок 5"/>
+          <p:cNvPicPr>
+            <a:picLocks noChangeAspect="1"/>
+          </p:cNvPicPr>
+          <p:nvPr/>
+        </p:nvPicPr>
+        <p:blipFill>
+          <a:blip r:embed="rId2" cstate="print">
+            <a:extLst>
+              <a:ext uri="{28A0092B-C50C-407E-A947-70E740481C1C}">
+                <a14:useLocalDpi xmlns:a14="http://schemas.microsoft.com/office/drawing/2010/main" val="0"/>
+              </a:ext>
+            </a:extLst>
+          </a:blip>
+          <a:stretch>
+            <a:fillRect/>
+          </a:stretch>
+        </p:blipFill>
+        <p:spPr>
+          <a:xfrm>
+            <a:off x="10296525" y="4471815"/>
+            <a:ext cx="519113" cy="519113"/>
+          </a:xfrm>
+          <a:prstGeom prst="rect">
+            <a:avLst/>
+          </a:prstGeom>
+        </p:spPr>
+      </p:pic>
+      <p:pic>
+        <p:nvPicPr>
+          <p:cNvPr id="7" name="Рисунок 6"/>
+          <p:cNvPicPr>
+            <a:picLocks noChangeAspect="1"/>
+          </p:cNvPicPr>
+          <p:nvPr/>
+        </p:nvPicPr>
+        <p:blipFill>
+          <a:blip r:embed="rId2" cstate="print">
+            <a:extLst>
+              <a:ext uri="{28A0092B-C50C-407E-A947-70E740481C1C}">
+                <a14:useLocalDpi xmlns:a14="http://schemas.microsoft.com/office/drawing/2010/main" val="0"/>
+              </a:ext>
+            </a:extLst>
+          </a:blip>
+          <a:stretch>
+            <a:fillRect/>
+          </a:stretch>
+        </p:blipFill>
+        <p:spPr>
+          <a:xfrm>
+            <a:off x="7629525" y="5671965"/>
+            <a:ext cx="519113" cy="519113"/>
+          </a:xfrm>
+          <a:prstGeom prst="rect">
+            <a:avLst/>
+          </a:prstGeom>
+        </p:spPr>
+      </p:pic>
+      <p:pic>
+        <p:nvPicPr>
+          <p:cNvPr id="8" name="Рисунок 7"/>
+          <p:cNvPicPr>
+            <a:picLocks noChangeAspect="1"/>
+          </p:cNvPicPr>
+          <p:nvPr/>
+        </p:nvPicPr>
+        <p:blipFill>
+          <a:blip r:embed="rId3" cstate="print">
+            <a:extLst>
+              <a:ext uri="{28A0092B-C50C-407E-A947-70E740481C1C}">
+                <a14:useLocalDpi xmlns:a14="http://schemas.microsoft.com/office/drawing/2010/main" val="0"/>
+              </a:ext>
+            </a:extLst>
+          </a:blip>
+          <a:stretch>
+            <a:fillRect/>
+          </a:stretch>
+        </p:blipFill>
+        <p:spPr>
+          <a:xfrm>
+            <a:off x="7629525" y="1157115"/>
+            <a:ext cx="409575" cy="468086"/>
+          </a:xfrm>
+          <a:prstGeom prst="rect">
+            <a:avLst/>
+          </a:prstGeom>
+        </p:spPr>
+      </p:pic>
+      <p:pic>
+        <p:nvPicPr>
+          <p:cNvPr id="9" name="Рисунок 8"/>
+          <p:cNvPicPr>
+            <a:picLocks noChangeAspect="1"/>
+          </p:cNvPicPr>
+          <p:nvPr/>
+        </p:nvPicPr>
+        <p:blipFill>
+          <a:blip r:embed="rId3" cstate="print">
+            <a:extLst>
+              <a:ext uri="{28A0092B-C50C-407E-A947-70E740481C1C}">
+                <a14:useLocalDpi xmlns:a14="http://schemas.microsoft.com/office/drawing/2010/main" val="0"/>
+              </a:ext>
+            </a:extLst>
+          </a:blip>
+          <a:stretch>
+            <a:fillRect/>
+          </a:stretch>
+        </p:blipFill>
+        <p:spPr>
+          <a:xfrm>
+            <a:off x="7629524" y="2946454"/>
+            <a:ext cx="409575" cy="468086"/>
+          </a:xfrm>
+          <a:prstGeom prst="rect">
+            <a:avLst/>
+          </a:prstGeom>
+        </p:spPr>
+      </p:pic>
+      <p:pic>
+        <p:nvPicPr>
+          <p:cNvPr id="10" name="Рисунок 9"/>
+          <p:cNvPicPr>
+            <a:picLocks noChangeAspect="1"/>
+          </p:cNvPicPr>
+          <p:nvPr/>
+        </p:nvPicPr>
+        <p:blipFill>
+          <a:blip r:embed="rId3" cstate="print">
+            <a:extLst>
+              <a:ext uri="{28A0092B-C50C-407E-A947-70E740481C1C}">
+                <a14:useLocalDpi xmlns:a14="http://schemas.microsoft.com/office/drawing/2010/main" val="0"/>
+              </a:ext>
+            </a:extLst>
+          </a:blip>
+          <a:stretch>
+            <a:fillRect/>
+          </a:stretch>
+        </p:blipFill>
+        <p:spPr>
+          <a:xfrm>
+            <a:off x="10406062" y="2946454"/>
+            <a:ext cx="409575" cy="468086"/>
+          </a:xfrm>
+          <a:prstGeom prst="rect">
+            <a:avLst/>
+          </a:prstGeom>
+        </p:spPr>
+      </p:pic>
+      <p:pic>
+        <p:nvPicPr>
+          <p:cNvPr id="11" name="Рисунок 10"/>
+          <p:cNvPicPr>
+            <a:picLocks noChangeAspect="1"/>
+          </p:cNvPicPr>
+          <p:nvPr/>
+        </p:nvPicPr>
+        <p:blipFill>
+          <a:blip r:embed="rId3" cstate="print">
+            <a:extLst>
+              <a:ext uri="{28A0092B-C50C-407E-A947-70E740481C1C}">
+                <a14:useLocalDpi xmlns:a14="http://schemas.microsoft.com/office/drawing/2010/main" val="0"/>
+              </a:ext>
+            </a:extLst>
+          </a:blip>
+          <a:stretch>
+            <a:fillRect/>
+          </a:stretch>
+        </p:blipFill>
+        <p:spPr>
+          <a:xfrm>
+            <a:off x="7629524" y="4075166"/>
+            <a:ext cx="409575" cy="468086"/>
+          </a:xfrm>
+          <a:prstGeom prst="rect">
+            <a:avLst/>
+          </a:prstGeom>
+        </p:spPr>
+      </p:pic>
+      <p:pic>
+        <p:nvPicPr>
+          <p:cNvPr id="13" name="Рисунок 12"/>
+          <p:cNvPicPr>
+            <a:picLocks noChangeAspect="1"/>
+          </p:cNvPicPr>
+          <p:nvPr/>
+        </p:nvPicPr>
+        <p:blipFill>
+          <a:blip r:embed="rId3" cstate="print">
+            <a:extLst>
+              <a:ext uri="{28A0092B-C50C-407E-A947-70E740481C1C}">
+                <a14:useLocalDpi xmlns:a14="http://schemas.microsoft.com/office/drawing/2010/main" val="0"/>
+              </a:ext>
+            </a:extLst>
+          </a:blip>
+          <a:stretch>
+            <a:fillRect/>
+          </a:stretch>
+        </p:blipFill>
+        <p:spPr>
+          <a:xfrm>
+            <a:off x="10406063" y="5437922"/>
+            <a:ext cx="409575" cy="468086"/>
+          </a:xfrm>
+          <a:prstGeom prst="rect">
+            <a:avLst/>
+          </a:prstGeom>
+        </p:spPr>
+      </p:pic>
     </p:spTree>
     <p:extLst>
       <p:ext uri="{BB962C8B-B14F-4D97-AF65-F5344CB8AC3E}">
@@ -10354,7 +12244,7 @@
           <p:cNvPr id="3" name="Content Placeholder 2">
             <a:extLst>
               <a:ext uri="{FF2B5EF4-FFF2-40B4-BE49-F238E27FC236}">
-                <a16:creationId xmlns="" xmlns:a16="http://schemas.microsoft.com/office/drawing/2014/main" id="{26CEDBBB-DE92-40B8-B2B5-F45A320C25F4}"/>
+                <a16:creationId xmlns:a16="http://schemas.microsoft.com/office/drawing/2014/main" xmlns="" id="{26CEDBBB-DE92-40B8-B2B5-F45A320C25F4}"/>
               </a:ext>
             </a:extLst>
           </p:cNvPr>
@@ -10423,7 +12313,7 @@
           <p:cNvPr id="4" name="Title 1">
             <a:extLst>
               <a:ext uri="{FF2B5EF4-FFF2-40B4-BE49-F238E27FC236}">
-                <a16:creationId xmlns="" xmlns:a16="http://schemas.microsoft.com/office/drawing/2014/main" id="{65E8CEB3-E3E6-4768-8409-72F9C78EF2D5}"/>
+                <a16:creationId xmlns:a16="http://schemas.microsoft.com/office/drawing/2014/main" xmlns="" id="{65E8CEB3-E3E6-4768-8409-72F9C78EF2D5}"/>
               </a:ext>
             </a:extLst>
           </p:cNvPr>
@@ -10552,7 +12442,7 @@
           <p:cNvPr id="5" name="Picture 4">
             <a:extLst>
               <a:ext uri="{FF2B5EF4-FFF2-40B4-BE49-F238E27FC236}">
-                <a16:creationId xmlns="" xmlns:a16="http://schemas.microsoft.com/office/drawing/2014/main" id="{34A4F7A9-FB6D-4A56-A01D-FC2A9E6A3C9D}"/>
+                <a16:creationId xmlns:a16="http://schemas.microsoft.com/office/drawing/2014/main" xmlns="" id="{34A4F7A9-FB6D-4A56-A01D-FC2A9E6A3C9D}"/>
               </a:ext>
             </a:extLst>
           </p:cNvPr>
@@ -10582,7 +12472,7 @@
           <p:cNvPr id="6" name="Picture 5">
             <a:extLst>
               <a:ext uri="{FF2B5EF4-FFF2-40B4-BE49-F238E27FC236}">
-                <a16:creationId xmlns="" xmlns:a16="http://schemas.microsoft.com/office/drawing/2014/main" id="{F1E797CF-4454-4FBB-8EEA-F80C7C5FD663}"/>
+                <a16:creationId xmlns:a16="http://schemas.microsoft.com/office/drawing/2014/main" xmlns="" id="{F1E797CF-4454-4FBB-8EEA-F80C7C5FD663}"/>
               </a:ext>
             </a:extLst>
           </p:cNvPr>
@@ -10612,7 +12502,7 @@
           <p:cNvPr id="7" name="Content Placeholder 2">
             <a:extLst>
               <a:ext uri="{FF2B5EF4-FFF2-40B4-BE49-F238E27FC236}">
-                <a16:creationId xmlns="" xmlns:a16="http://schemas.microsoft.com/office/drawing/2014/main" id="{B4FAFC74-F36D-4B61-BE12-E6EFAC28AC60}"/>
+                <a16:creationId xmlns:a16="http://schemas.microsoft.com/office/drawing/2014/main" xmlns="" id="{B4FAFC74-F36D-4B61-BE12-E6EFAC28AC60}"/>
               </a:ext>
             </a:extLst>
           </p:cNvPr>
@@ -10953,7 +12843,7 @@
           <p:cNvPr id="4" name="Picture 3">
             <a:extLst>
               <a:ext uri="{FF2B5EF4-FFF2-40B4-BE49-F238E27FC236}">
-                <a16:creationId xmlns="" xmlns:a16="http://schemas.microsoft.com/office/drawing/2014/main" id="{7EBB1CAC-E82C-4575-A59E-808C14D22364}"/>
+                <a16:creationId xmlns:a16="http://schemas.microsoft.com/office/drawing/2014/main" xmlns="" id="{7EBB1CAC-E82C-4575-A59E-808C14D22364}"/>
               </a:ext>
             </a:extLst>
           </p:cNvPr>
@@ -10982,7 +12872,7 @@
           <p:cNvPr id="5" name="Title 1">
             <a:extLst>
               <a:ext uri="{FF2B5EF4-FFF2-40B4-BE49-F238E27FC236}">
-                <a16:creationId xmlns="" xmlns:a16="http://schemas.microsoft.com/office/drawing/2014/main" id="{AB45E17C-D635-444C-9E6E-9F0B20ABC34B}"/>
+                <a16:creationId xmlns:a16="http://schemas.microsoft.com/office/drawing/2014/main" xmlns="" id="{AB45E17C-D635-444C-9E6E-9F0B20ABC34B}"/>
               </a:ext>
             </a:extLst>
           </p:cNvPr>
@@ -11099,7 +12989,7 @@
           <p:cNvPr id="6" name="Picture 5">
             <a:extLst>
               <a:ext uri="{FF2B5EF4-FFF2-40B4-BE49-F238E27FC236}">
-                <a16:creationId xmlns="" xmlns:a16="http://schemas.microsoft.com/office/drawing/2014/main" id="{C590E18E-DB35-48A2-8D01-CCDDC5796071}"/>
+                <a16:creationId xmlns:a16="http://schemas.microsoft.com/office/drawing/2014/main" xmlns="" id="{C590E18E-DB35-48A2-8D01-CCDDC5796071}"/>
               </a:ext>
             </a:extLst>
           </p:cNvPr>
@@ -11129,7 +13019,7 @@
           <p:cNvPr id="7" name="Content Placeholder 2">
             <a:extLst>
               <a:ext uri="{FF2B5EF4-FFF2-40B4-BE49-F238E27FC236}">
-                <a16:creationId xmlns="" xmlns:a16="http://schemas.microsoft.com/office/drawing/2014/main" id="{6423B81A-58F9-4F18-87B4-FC1F266353F5}"/>
+                <a16:creationId xmlns:a16="http://schemas.microsoft.com/office/drawing/2014/main" xmlns="" id="{6423B81A-58F9-4F18-87B4-FC1F266353F5}"/>
               </a:ext>
             </a:extLst>
           </p:cNvPr>
@@ -11678,7 +13568,7 @@
           <p:cNvPr id="4" name="Title 1">
             <a:extLst>
               <a:ext uri="{FF2B5EF4-FFF2-40B4-BE49-F238E27FC236}">
-                <a16:creationId xmlns="" xmlns:a16="http://schemas.microsoft.com/office/drawing/2014/main" id="{AB45E17C-D635-444C-9E6E-9F0B20ABC34B}"/>
+                <a16:creationId xmlns:a16="http://schemas.microsoft.com/office/drawing/2014/main" xmlns="" id="{AB45E17C-D635-444C-9E6E-9F0B20ABC34B}"/>
               </a:ext>
             </a:extLst>
           </p:cNvPr>
@@ -12082,7 +13972,7 @@
           <p:cNvPr id="4" name="Title 1">
             <a:extLst>
               <a:ext uri="{FF2B5EF4-FFF2-40B4-BE49-F238E27FC236}">
-                <a16:creationId xmlns="" xmlns:a16="http://schemas.microsoft.com/office/drawing/2014/main" id="{AB45E17C-D635-444C-9E6E-9F0B20ABC34B}"/>
+                <a16:creationId xmlns:a16="http://schemas.microsoft.com/office/drawing/2014/main" xmlns="" id="{AB45E17C-D635-444C-9E6E-9F0B20ABC34B}"/>
               </a:ext>
             </a:extLst>
           </p:cNvPr>

</xml_diff>